<commit_message>
needs conclusion, additional diagrams
</commit_message>
<xml_diff>
--- a/Poster353.pptx
+++ b/Poster353.pptx
@@ -1,22 +1,450 @@
 
 <file path=ppt/presentation.xml><?xml version="1.0" encoding="utf-8"?>
-<p:presentation xmlns:a="http://schemas.openxmlformats.org/drawingml/2006/main" xmlns:p="http://schemas.openxmlformats.org/presentationml/2006/main" xmlns:r="http://schemas.openxmlformats.org/officeDocument/2006/relationships" xmlns:p14="http://schemas.microsoft.com/office/powerpoint/2010/main" xmlns:p15="http://schemas.microsoft.com/office/powerpoint/2012/main" xmlns:mc="http://schemas.openxmlformats.org/markup-compatibility/2006">
+<p:presentation xmlns:a="http://schemas.openxmlformats.org/drawingml/2006/main" xmlns:r="http://schemas.openxmlformats.org/officeDocument/2006/relationships" xmlns:p="http://schemas.openxmlformats.org/presentationml/2006/main" saveSubsetFonts="1">
   <p:sldMasterIdLst>
-    <p:sldMasterId id="2147483648" r:id="rId2"/>
+    <p:sldMasterId id="2147483648" r:id="rId1"/>
   </p:sldMasterIdLst>
   <p:notesMasterIdLst>
     <p:notesMasterId r:id="rId3"/>
   </p:notesMasterIdLst>
   <p:sldIdLst>
-    <p:sldId id="256" r:id="rId4"/>
+    <p:sldId id="256" r:id="rId2"/>
   </p:sldIdLst>
   <p:sldSz cx="43891200" cy="32918400"/>
-  <p:notesSz cx="42648187" cy="32104012"/>
+  <p:notesSz cx="42648188" cy="32104013"/>
+  <p:defaultTextStyle>
+    <a:defPPr>
+      <a:defRPr lang="en-US"/>
+    </a:defPPr>
+    <a:lvl1pPr marL="0" algn="l" defTabSz="914400" rtl="0" eaLnBrk="1" latinLnBrk="0" hangingPunct="1">
+      <a:defRPr sz="1800" kern="1200">
+        <a:solidFill>
+          <a:schemeClr val="tx1"/>
+        </a:solidFill>
+        <a:latin typeface="+mn-lt"/>
+        <a:ea typeface="+mn-ea"/>
+        <a:cs typeface="+mn-cs"/>
+      </a:defRPr>
+    </a:lvl1pPr>
+    <a:lvl2pPr marL="457200" algn="l" defTabSz="914400" rtl="0" eaLnBrk="1" latinLnBrk="0" hangingPunct="1">
+      <a:defRPr sz="1800" kern="1200">
+        <a:solidFill>
+          <a:schemeClr val="tx1"/>
+        </a:solidFill>
+        <a:latin typeface="+mn-lt"/>
+        <a:ea typeface="+mn-ea"/>
+        <a:cs typeface="+mn-cs"/>
+      </a:defRPr>
+    </a:lvl2pPr>
+    <a:lvl3pPr marL="914400" algn="l" defTabSz="914400" rtl="0" eaLnBrk="1" latinLnBrk="0" hangingPunct="1">
+      <a:defRPr sz="1800" kern="1200">
+        <a:solidFill>
+          <a:schemeClr val="tx1"/>
+        </a:solidFill>
+        <a:latin typeface="+mn-lt"/>
+        <a:ea typeface="+mn-ea"/>
+        <a:cs typeface="+mn-cs"/>
+      </a:defRPr>
+    </a:lvl3pPr>
+    <a:lvl4pPr marL="1371600" algn="l" defTabSz="914400" rtl="0" eaLnBrk="1" latinLnBrk="0" hangingPunct="1">
+      <a:defRPr sz="1800" kern="1200">
+        <a:solidFill>
+          <a:schemeClr val="tx1"/>
+        </a:solidFill>
+        <a:latin typeface="+mn-lt"/>
+        <a:ea typeface="+mn-ea"/>
+        <a:cs typeface="+mn-cs"/>
+      </a:defRPr>
+    </a:lvl4pPr>
+    <a:lvl5pPr marL="1828800" algn="l" defTabSz="914400" rtl="0" eaLnBrk="1" latinLnBrk="0" hangingPunct="1">
+      <a:defRPr sz="1800" kern="1200">
+        <a:solidFill>
+          <a:schemeClr val="tx1"/>
+        </a:solidFill>
+        <a:latin typeface="+mn-lt"/>
+        <a:ea typeface="+mn-ea"/>
+        <a:cs typeface="+mn-cs"/>
+      </a:defRPr>
+    </a:lvl5pPr>
+    <a:lvl6pPr marL="2286000" algn="l" defTabSz="914400" rtl="0" eaLnBrk="1" latinLnBrk="0" hangingPunct="1">
+      <a:defRPr sz="1800" kern="1200">
+        <a:solidFill>
+          <a:schemeClr val="tx1"/>
+        </a:solidFill>
+        <a:latin typeface="+mn-lt"/>
+        <a:ea typeface="+mn-ea"/>
+        <a:cs typeface="+mn-cs"/>
+      </a:defRPr>
+    </a:lvl6pPr>
+    <a:lvl7pPr marL="2743200" algn="l" defTabSz="914400" rtl="0" eaLnBrk="1" latinLnBrk="0" hangingPunct="1">
+      <a:defRPr sz="1800" kern="1200">
+        <a:solidFill>
+          <a:schemeClr val="tx1"/>
+        </a:solidFill>
+        <a:latin typeface="+mn-lt"/>
+        <a:ea typeface="+mn-ea"/>
+        <a:cs typeface="+mn-cs"/>
+      </a:defRPr>
+    </a:lvl7pPr>
+    <a:lvl8pPr marL="3200400" algn="l" defTabSz="914400" rtl="0" eaLnBrk="1" latinLnBrk="0" hangingPunct="1">
+      <a:defRPr sz="1800" kern="1200">
+        <a:solidFill>
+          <a:schemeClr val="tx1"/>
+        </a:solidFill>
+        <a:latin typeface="+mn-lt"/>
+        <a:ea typeface="+mn-ea"/>
+        <a:cs typeface="+mn-cs"/>
+      </a:defRPr>
+    </a:lvl8pPr>
+    <a:lvl9pPr marL="3657600" algn="l" defTabSz="914400" rtl="0" eaLnBrk="1" latinLnBrk="0" hangingPunct="1">
+      <a:defRPr sz="1800" kern="1200">
+        <a:solidFill>
+          <a:schemeClr val="tx1"/>
+        </a:solidFill>
+        <a:latin typeface="+mn-lt"/>
+        <a:ea typeface="+mn-ea"/>
+        <a:cs typeface="+mn-cs"/>
+      </a:defRPr>
+    </a:lvl9pPr>
+  </p:defaultTextStyle>
 </p:presentation>
 </file>
 
 <file path=ppt/notesMasters/notesMaster1.xml><?xml version="1.0" encoding="utf-8"?>
-<p:notesMaster xmlns:a="http://schemas.openxmlformats.org/drawingml/2006/main" xmlns:p="http://schemas.openxmlformats.org/presentationml/2006/main" xmlns:r="http://schemas.openxmlformats.org/officeDocument/2006/relationships" xmlns:p14="http://schemas.microsoft.com/office/powerpoint/2010/main" xmlns:p15="http://schemas.microsoft.com/office/powerpoint/2012/main" xmlns:mc="http://schemas.openxmlformats.org/markup-compatibility/2006">
+<p:notesMaster xmlns:a="http://schemas.openxmlformats.org/drawingml/2006/main" xmlns:r="http://schemas.openxmlformats.org/officeDocument/2006/relationships" xmlns:p="http://schemas.openxmlformats.org/presentationml/2006/main">
+  <p:cSld>
+    <p:bg>
+      <p:bgRef idx="1001">
+        <a:schemeClr val="bg1"/>
+      </p:bgRef>
+    </p:bg>
+    <p:spTree>
+      <p:nvGrpSpPr>
+        <p:cNvPr id="1" name=""/>
+        <p:cNvGrpSpPr/>
+        <p:nvPr/>
+      </p:nvGrpSpPr>
+      <p:grpSpPr>
+        <a:xfrm>
+          <a:off x="0" y="0"/>
+          <a:ext cx="0" cy="0"/>
+          <a:chOff x="0" y="0"/>
+          <a:chExt cx="0" cy="0"/>
+        </a:xfrm>
+      </p:grpSpPr>
+      <p:sp>
+        <p:nvSpPr>
+          <p:cNvPr id="37" name="PlaceHolder 1"/>
+          <p:cNvSpPr>
+            <a:spLocks noGrp="1"/>
+          </p:cNvSpPr>
+          <p:nvPr>
+            <p:ph type="body"/>
+          </p:nvPr>
+        </p:nvSpPr>
+        <p:spPr>
+          <a:xfrm>
+            <a:off x="777240" y="4777560"/>
+            <a:ext cx="6217560" cy="4525920"/>
+          </a:xfrm>
+          <a:prstGeom prst="rect">
+            <a:avLst/>
+          </a:prstGeom>
+        </p:spPr>
+        <p:txBody>
+          <a:bodyPr lIns="0" tIns="0" rIns="0" bIns="0"/>
+          <a:lstStyle/>
+          <a:p>
+            <a:r>
+              <a:rPr lang="en-US" sz="2000" b="0" strike="noStrike" spc="-1">
+                <a:solidFill>
+                  <a:srgbClr val="000000"/>
+                </a:solidFill>
+                <a:uFill>
+                  <a:solidFill>
+                    <a:srgbClr val="FFFFFF"/>
+                  </a:solidFill>
+                </a:uFill>
+                <a:latin typeface="Arial"/>
+              </a:rPr>
+              <a:t>Click to edit the notes format</a:t>
+            </a:r>
+          </a:p>
+        </p:txBody>
+      </p:sp>
+      <p:sp>
+        <p:nvSpPr>
+          <p:cNvPr id="38" name="PlaceHolder 2"/>
+          <p:cNvSpPr>
+            <a:spLocks noGrp="1"/>
+          </p:cNvSpPr>
+          <p:nvPr>
+            <p:ph type="hdr"/>
+          </p:nvPr>
+        </p:nvSpPr>
+        <p:spPr>
+          <a:xfrm>
+            <a:off x="0" y="0"/>
+            <a:ext cx="3372840" cy="502560"/>
+          </a:xfrm>
+          <a:prstGeom prst="rect">
+            <a:avLst/>
+          </a:prstGeom>
+        </p:spPr>
+        <p:txBody>
+          <a:bodyPr lIns="0" tIns="0" rIns="0" bIns="0"/>
+          <a:lstStyle/>
+          <a:p>
+            <a:r>
+              <a:rPr lang="en-US" sz="1400" b="0" strike="noStrike" spc="-1">
+                <a:solidFill>
+                  <a:srgbClr val="000000"/>
+                </a:solidFill>
+                <a:uFill>
+                  <a:solidFill>
+                    <a:srgbClr val="FFFFFF"/>
+                  </a:solidFill>
+                </a:uFill>
+                <a:latin typeface="Times New Roman"/>
+              </a:rPr>
+              <a:t>&lt;header&gt;</a:t>
+            </a:r>
+          </a:p>
+        </p:txBody>
+      </p:sp>
+      <p:sp>
+        <p:nvSpPr>
+          <p:cNvPr id="39" name="PlaceHolder 3"/>
+          <p:cNvSpPr>
+            <a:spLocks noGrp="1"/>
+          </p:cNvSpPr>
+          <p:nvPr>
+            <p:ph type="dt"/>
+          </p:nvPr>
+        </p:nvSpPr>
+        <p:spPr>
+          <a:xfrm>
+            <a:off x="4399200" y="0"/>
+            <a:ext cx="3372840" cy="502560"/>
+          </a:xfrm>
+          <a:prstGeom prst="rect">
+            <a:avLst/>
+          </a:prstGeom>
+        </p:spPr>
+        <p:txBody>
+          <a:bodyPr lIns="0" tIns="0" rIns="0" bIns="0"/>
+          <a:lstStyle/>
+          <a:p>
+            <a:pPr algn="r"/>
+            <a:r>
+              <a:rPr lang="en-US" sz="1400" b="0" strike="noStrike" spc="-1">
+                <a:solidFill>
+                  <a:srgbClr val="000000"/>
+                </a:solidFill>
+                <a:uFill>
+                  <a:solidFill>
+                    <a:srgbClr val="FFFFFF"/>
+                  </a:solidFill>
+                </a:uFill>
+                <a:latin typeface="Times New Roman"/>
+              </a:rPr>
+              <a:t>&lt;date/time&gt;</a:t>
+            </a:r>
+          </a:p>
+        </p:txBody>
+      </p:sp>
+      <p:sp>
+        <p:nvSpPr>
+          <p:cNvPr id="40" name="PlaceHolder 4"/>
+          <p:cNvSpPr>
+            <a:spLocks noGrp="1"/>
+          </p:cNvSpPr>
+          <p:nvPr>
+            <p:ph type="ftr"/>
+          </p:nvPr>
+        </p:nvSpPr>
+        <p:spPr>
+          <a:xfrm>
+            <a:off x="0" y="9555480"/>
+            <a:ext cx="3372840" cy="502560"/>
+          </a:xfrm>
+          <a:prstGeom prst="rect">
+            <a:avLst/>
+          </a:prstGeom>
+        </p:spPr>
+        <p:txBody>
+          <a:bodyPr lIns="0" tIns="0" rIns="0" bIns="0" anchor="b"/>
+          <a:lstStyle/>
+          <a:p>
+            <a:r>
+              <a:rPr lang="en-US" sz="1400" b="0" strike="noStrike" spc="-1">
+                <a:solidFill>
+                  <a:srgbClr val="000000"/>
+                </a:solidFill>
+                <a:uFill>
+                  <a:solidFill>
+                    <a:srgbClr val="FFFFFF"/>
+                  </a:solidFill>
+                </a:uFill>
+                <a:latin typeface="Times New Roman"/>
+              </a:rPr>
+              <a:t>&lt;footer&gt;</a:t>
+            </a:r>
+          </a:p>
+        </p:txBody>
+      </p:sp>
+      <p:sp>
+        <p:nvSpPr>
+          <p:cNvPr id="41" name="PlaceHolder 5"/>
+          <p:cNvSpPr>
+            <a:spLocks noGrp="1"/>
+          </p:cNvSpPr>
+          <p:nvPr>
+            <p:ph type="sldNum"/>
+          </p:nvPr>
+        </p:nvSpPr>
+        <p:spPr>
+          <a:xfrm>
+            <a:off x="4399200" y="9555480"/>
+            <a:ext cx="3372840" cy="502560"/>
+          </a:xfrm>
+          <a:prstGeom prst="rect">
+            <a:avLst/>
+          </a:prstGeom>
+        </p:spPr>
+        <p:txBody>
+          <a:bodyPr lIns="0" tIns="0" rIns="0" bIns="0" anchor="b"/>
+          <a:lstStyle/>
+          <a:p>
+            <a:pPr algn="r"/>
+            <a:fld id="{87111A1D-FD06-40CF-996E-504BFA4B1E84}" type="slidenum">
+              <a:rPr lang="en-US" sz="1400" b="0" strike="noStrike" spc="-1">
+                <a:solidFill>
+                  <a:srgbClr val="000000"/>
+                </a:solidFill>
+                <a:uFill>
+                  <a:solidFill>
+                    <a:srgbClr val="FFFFFF"/>
+                  </a:solidFill>
+                </a:uFill>
+                <a:latin typeface="Times New Roman"/>
+              </a:rPr>
+              <a:t>‹#›</a:t>
+            </a:fld>
+            <a:endParaRPr lang="en-US" sz="1400" b="0" strike="noStrike" spc="-1">
+              <a:solidFill>
+                <a:srgbClr val="000000"/>
+              </a:solidFill>
+              <a:uFill>
+                <a:solidFill>
+                  <a:srgbClr val="FFFFFF"/>
+                </a:solidFill>
+              </a:uFill>
+              <a:latin typeface="Times New Roman"/>
+            </a:endParaRPr>
+          </a:p>
+        </p:txBody>
+      </p:sp>
+    </p:spTree>
+  </p:cSld>
+  <p:clrMap bg1="lt1" tx1="dk1" bg2="lt2" tx2="dk2" accent1="accent1" accent2="accent2" accent3="accent3" accent4="accent4" accent5="accent5" accent6="accent6" hlink="hlink" folHlink="folHlink"/>
+  <p:notesStyle>
+    <a:lvl1pPr marL="0" algn="l" defTabSz="914400" rtl="0" eaLnBrk="1" latinLnBrk="0" hangingPunct="1">
+      <a:defRPr sz="1200" kern="1200">
+        <a:solidFill>
+          <a:schemeClr val="tx1"/>
+        </a:solidFill>
+        <a:latin typeface="+mn-lt"/>
+        <a:ea typeface="+mn-ea"/>
+        <a:cs typeface="+mn-cs"/>
+      </a:defRPr>
+    </a:lvl1pPr>
+    <a:lvl2pPr marL="457200" algn="l" defTabSz="914400" rtl="0" eaLnBrk="1" latinLnBrk="0" hangingPunct="1">
+      <a:defRPr sz="1200" kern="1200">
+        <a:solidFill>
+          <a:schemeClr val="tx1"/>
+        </a:solidFill>
+        <a:latin typeface="+mn-lt"/>
+        <a:ea typeface="+mn-ea"/>
+        <a:cs typeface="+mn-cs"/>
+      </a:defRPr>
+    </a:lvl2pPr>
+    <a:lvl3pPr marL="914400" algn="l" defTabSz="914400" rtl="0" eaLnBrk="1" latinLnBrk="0" hangingPunct="1">
+      <a:defRPr sz="1200" kern="1200">
+        <a:solidFill>
+          <a:schemeClr val="tx1"/>
+        </a:solidFill>
+        <a:latin typeface="+mn-lt"/>
+        <a:ea typeface="+mn-ea"/>
+        <a:cs typeface="+mn-cs"/>
+      </a:defRPr>
+    </a:lvl3pPr>
+    <a:lvl4pPr marL="1371600" algn="l" defTabSz="914400" rtl="0" eaLnBrk="1" latinLnBrk="0" hangingPunct="1">
+      <a:defRPr sz="1200" kern="1200">
+        <a:solidFill>
+          <a:schemeClr val="tx1"/>
+        </a:solidFill>
+        <a:latin typeface="+mn-lt"/>
+        <a:ea typeface="+mn-ea"/>
+        <a:cs typeface="+mn-cs"/>
+      </a:defRPr>
+    </a:lvl4pPr>
+    <a:lvl5pPr marL="1828800" algn="l" defTabSz="914400" rtl="0" eaLnBrk="1" latinLnBrk="0" hangingPunct="1">
+      <a:defRPr sz="1200" kern="1200">
+        <a:solidFill>
+          <a:schemeClr val="tx1"/>
+        </a:solidFill>
+        <a:latin typeface="+mn-lt"/>
+        <a:ea typeface="+mn-ea"/>
+        <a:cs typeface="+mn-cs"/>
+      </a:defRPr>
+    </a:lvl5pPr>
+    <a:lvl6pPr marL="2286000" algn="l" defTabSz="914400" rtl="0" eaLnBrk="1" latinLnBrk="0" hangingPunct="1">
+      <a:defRPr sz="1200" kern="1200">
+        <a:solidFill>
+          <a:schemeClr val="tx1"/>
+        </a:solidFill>
+        <a:latin typeface="+mn-lt"/>
+        <a:ea typeface="+mn-ea"/>
+        <a:cs typeface="+mn-cs"/>
+      </a:defRPr>
+    </a:lvl6pPr>
+    <a:lvl7pPr marL="2743200" algn="l" defTabSz="914400" rtl="0" eaLnBrk="1" latinLnBrk="0" hangingPunct="1">
+      <a:defRPr sz="1200" kern="1200">
+        <a:solidFill>
+          <a:schemeClr val="tx1"/>
+        </a:solidFill>
+        <a:latin typeface="+mn-lt"/>
+        <a:ea typeface="+mn-ea"/>
+        <a:cs typeface="+mn-cs"/>
+      </a:defRPr>
+    </a:lvl7pPr>
+    <a:lvl8pPr marL="3200400" algn="l" defTabSz="914400" rtl="0" eaLnBrk="1" latinLnBrk="0" hangingPunct="1">
+      <a:defRPr sz="1200" kern="1200">
+        <a:solidFill>
+          <a:schemeClr val="tx1"/>
+        </a:solidFill>
+        <a:latin typeface="+mn-lt"/>
+        <a:ea typeface="+mn-ea"/>
+        <a:cs typeface="+mn-cs"/>
+      </a:defRPr>
+    </a:lvl8pPr>
+    <a:lvl9pPr marL="3657600" algn="l" defTabSz="914400" rtl="0" eaLnBrk="1" latinLnBrk="0" hangingPunct="1">
+      <a:defRPr sz="1200" kern="1200">
+        <a:solidFill>
+          <a:schemeClr val="tx1"/>
+        </a:solidFill>
+        <a:latin typeface="+mn-lt"/>
+        <a:ea typeface="+mn-ea"/>
+        <a:cs typeface="+mn-cs"/>
+      </a:defRPr>
+    </a:lvl9pPr>
+  </p:notesStyle>
+</p:notesMaster>
+</file>
+
+<file path=ppt/notesSlides/notesSlide1.xml><?xml version="1.0" encoding="utf-8"?>
+<p:notes xmlns:a="http://schemas.openxmlformats.org/drawingml/2006/main" xmlns:r="http://schemas.openxmlformats.org/officeDocument/2006/relationships" xmlns:p="http://schemas.openxmlformats.org/presentationml/2006/main">
   <p:cSld>
     <p:spTree>
       <p:nvGrpSpPr>
@@ -34,281 +462,6 @@
       </p:grpSpPr>
       <p:sp>
         <p:nvSpPr>
-          <p:cNvPr id="37" name="PlaceHolder 1"/>
-          <p:cNvSpPr>
-            <a:spLocks noGrp="1"/>
-          </p:cNvSpPr>
-          <p:nvPr>
-            <p:ph type="body"/>
-          </p:nvPr>
-        </p:nvSpPr>
-        <p:spPr>
-          <a:xfrm>
-            <a:off x="777240" y="4777560"/>
-            <a:ext cx="6217560" cy="4525920"/>
-          </a:xfrm>
-          <a:prstGeom prst="rect">
-            <a:avLst/>
-          </a:prstGeom>
-        </p:spPr>
-        <p:txBody>
-          <a:bodyPr lIns="0" rIns="0" tIns="0" bIns="0"/>
-          <a:p>
-            <a:r>
-              <a:rPr b="0" lang="en-US" sz="2000" spc="-1" strike="noStrike">
-                <a:solidFill>
-                  <a:srgbClr val="000000"/>
-                </a:solidFill>
-                <a:uFill>
-                  <a:solidFill>
-                    <a:srgbClr val="ffffff"/>
-                  </a:solidFill>
-                </a:uFill>
-                <a:latin typeface="Arial"/>
-              </a:rPr>
-              <a:t>Click to edit the notes format</a:t>
-            </a:r>
-            <a:endParaRPr b="0" lang="en-US" sz="2000" spc="-1" strike="noStrike">
-              <a:solidFill>
-                <a:srgbClr val="000000"/>
-              </a:solidFill>
-              <a:uFill>
-                <a:solidFill>
-                  <a:srgbClr val="ffffff"/>
-                </a:solidFill>
-              </a:uFill>
-              <a:latin typeface="Arial"/>
-            </a:endParaRPr>
-          </a:p>
-        </p:txBody>
-      </p:sp>
-      <p:sp>
-        <p:nvSpPr>
-          <p:cNvPr id="38" name="PlaceHolder 2"/>
-          <p:cNvSpPr>
-            <a:spLocks noGrp="1"/>
-          </p:cNvSpPr>
-          <p:nvPr>
-            <p:ph type="hdr"/>
-          </p:nvPr>
-        </p:nvSpPr>
-        <p:spPr>
-          <a:xfrm>
-            <a:off x="0" y="0"/>
-            <a:ext cx="3372840" cy="502560"/>
-          </a:xfrm>
-          <a:prstGeom prst="rect">
-            <a:avLst/>
-          </a:prstGeom>
-        </p:spPr>
-        <p:txBody>
-          <a:bodyPr lIns="0" rIns="0" tIns="0" bIns="0"/>
-          <a:p>
-            <a:r>
-              <a:rPr b="0" lang="en-US" sz="1400" spc="-1" strike="noStrike">
-                <a:solidFill>
-                  <a:srgbClr val="000000"/>
-                </a:solidFill>
-                <a:uFill>
-                  <a:solidFill>
-                    <a:srgbClr val="ffffff"/>
-                  </a:solidFill>
-                </a:uFill>
-                <a:latin typeface="Times New Roman"/>
-              </a:rPr>
-              <a:t>&lt;header&gt;</a:t>
-            </a:r>
-            <a:endParaRPr b="0" lang="en-US" sz="1400" spc="-1" strike="noStrike">
-              <a:solidFill>
-                <a:srgbClr val="000000"/>
-              </a:solidFill>
-              <a:uFill>
-                <a:solidFill>
-                  <a:srgbClr val="ffffff"/>
-                </a:solidFill>
-              </a:uFill>
-              <a:latin typeface="Times New Roman"/>
-            </a:endParaRPr>
-          </a:p>
-        </p:txBody>
-      </p:sp>
-      <p:sp>
-        <p:nvSpPr>
-          <p:cNvPr id="39" name="PlaceHolder 3"/>
-          <p:cNvSpPr>
-            <a:spLocks noGrp="1"/>
-          </p:cNvSpPr>
-          <p:nvPr>
-            <p:ph type="dt"/>
-          </p:nvPr>
-        </p:nvSpPr>
-        <p:spPr>
-          <a:xfrm>
-            <a:off x="4399200" y="0"/>
-            <a:ext cx="3372840" cy="502560"/>
-          </a:xfrm>
-          <a:prstGeom prst="rect">
-            <a:avLst/>
-          </a:prstGeom>
-        </p:spPr>
-        <p:txBody>
-          <a:bodyPr lIns="0" rIns="0" tIns="0" bIns="0"/>
-          <a:p>
-            <a:pPr algn="r"/>
-            <a:r>
-              <a:rPr b="0" lang="en-US" sz="1400" spc="-1" strike="noStrike">
-                <a:solidFill>
-                  <a:srgbClr val="000000"/>
-                </a:solidFill>
-                <a:uFill>
-                  <a:solidFill>
-                    <a:srgbClr val="ffffff"/>
-                  </a:solidFill>
-                </a:uFill>
-                <a:latin typeface="Times New Roman"/>
-              </a:rPr>
-              <a:t>&lt;date/time&gt;</a:t>
-            </a:r>
-            <a:endParaRPr b="0" lang="en-US" sz="1400" spc="-1" strike="noStrike">
-              <a:solidFill>
-                <a:srgbClr val="000000"/>
-              </a:solidFill>
-              <a:uFill>
-                <a:solidFill>
-                  <a:srgbClr val="ffffff"/>
-                </a:solidFill>
-              </a:uFill>
-              <a:latin typeface="Times New Roman"/>
-            </a:endParaRPr>
-          </a:p>
-        </p:txBody>
-      </p:sp>
-      <p:sp>
-        <p:nvSpPr>
-          <p:cNvPr id="40" name="PlaceHolder 4"/>
-          <p:cNvSpPr>
-            <a:spLocks noGrp="1"/>
-          </p:cNvSpPr>
-          <p:nvPr>
-            <p:ph type="ftr"/>
-          </p:nvPr>
-        </p:nvSpPr>
-        <p:spPr>
-          <a:xfrm>
-            <a:off x="0" y="9555480"/>
-            <a:ext cx="3372840" cy="502560"/>
-          </a:xfrm>
-          <a:prstGeom prst="rect">
-            <a:avLst/>
-          </a:prstGeom>
-        </p:spPr>
-        <p:txBody>
-          <a:bodyPr lIns="0" rIns="0" tIns="0" bIns="0" anchor="b"/>
-          <a:p>
-            <a:r>
-              <a:rPr b="0" lang="en-US" sz="1400" spc="-1" strike="noStrike">
-                <a:solidFill>
-                  <a:srgbClr val="000000"/>
-                </a:solidFill>
-                <a:uFill>
-                  <a:solidFill>
-                    <a:srgbClr val="ffffff"/>
-                  </a:solidFill>
-                </a:uFill>
-                <a:latin typeface="Times New Roman"/>
-              </a:rPr>
-              <a:t>&lt;footer&gt;</a:t>
-            </a:r>
-            <a:endParaRPr b="0" lang="en-US" sz="1400" spc="-1" strike="noStrike">
-              <a:solidFill>
-                <a:srgbClr val="000000"/>
-              </a:solidFill>
-              <a:uFill>
-                <a:solidFill>
-                  <a:srgbClr val="ffffff"/>
-                </a:solidFill>
-              </a:uFill>
-              <a:latin typeface="Times New Roman"/>
-            </a:endParaRPr>
-          </a:p>
-        </p:txBody>
-      </p:sp>
-      <p:sp>
-        <p:nvSpPr>
-          <p:cNvPr id="41" name="PlaceHolder 5"/>
-          <p:cNvSpPr>
-            <a:spLocks noGrp="1"/>
-          </p:cNvSpPr>
-          <p:nvPr>
-            <p:ph type="sldNum"/>
-          </p:nvPr>
-        </p:nvSpPr>
-        <p:spPr>
-          <a:xfrm>
-            <a:off x="4399200" y="9555480"/>
-            <a:ext cx="3372840" cy="502560"/>
-          </a:xfrm>
-          <a:prstGeom prst="rect">
-            <a:avLst/>
-          </a:prstGeom>
-        </p:spPr>
-        <p:txBody>
-          <a:bodyPr lIns="0" rIns="0" tIns="0" bIns="0" anchor="b"/>
-          <a:p>
-            <a:pPr algn="r"/>
-            <a:fld id="{87111A1D-FD06-40CF-996E-504BFA4B1E84}" type="slidenum">
-              <a:rPr b="0" lang="en-US" sz="1400" spc="-1" strike="noStrike">
-                <a:solidFill>
-                  <a:srgbClr val="000000"/>
-                </a:solidFill>
-                <a:uFill>
-                  <a:solidFill>
-                    <a:srgbClr val="ffffff"/>
-                  </a:solidFill>
-                </a:uFill>
-                <a:latin typeface="Times New Roman"/>
-              </a:rPr>
-              <a:t>&lt;number&gt;</a:t>
-            </a:fld>
-            <a:endParaRPr b="0" lang="en-US" sz="1400" spc="-1" strike="noStrike">
-              <a:solidFill>
-                <a:srgbClr val="000000"/>
-              </a:solidFill>
-              <a:uFill>
-                <a:solidFill>
-                  <a:srgbClr val="ffffff"/>
-                </a:solidFill>
-              </a:uFill>
-              <a:latin typeface="Times New Roman"/>
-            </a:endParaRPr>
-          </a:p>
-        </p:txBody>
-      </p:sp>
-    </p:spTree>
-  </p:cSld>
-  <p:clrMap bg1="lt1" bg2="lt2" tx1="dk1" tx2="dk2" accent1="accent1" accent2="accent2" accent3="accent3" accent4="accent4" accent5="accent5" accent6="accent6" hlink="hlink" folHlink="folHlink"/>
-</p:notesMaster>
-</file>
-
-<file path=ppt/notesSlides/notesSlide1.xml><?xml version="1.0" encoding="utf-8"?>
-<p:notes xmlns:a="http://schemas.openxmlformats.org/drawingml/2006/main" xmlns:p="http://schemas.openxmlformats.org/presentationml/2006/main" xmlns:r="http://schemas.openxmlformats.org/officeDocument/2006/relationships" xmlns:p14="http://schemas.microsoft.com/office/powerpoint/2010/main" xmlns:p15="http://schemas.microsoft.com/office/powerpoint/2012/main" xmlns:mc="http://schemas.openxmlformats.org/markup-compatibility/2006">
-  <p:cSld>
-    <p:spTree>
-      <p:nvGrpSpPr>
-        <p:cNvPr id="1" name=""/>
-        <p:cNvGrpSpPr/>
-        <p:nvPr/>
-      </p:nvGrpSpPr>
-      <p:grpSpPr>
-        <a:xfrm>
-          <a:off x="0" y="0"/>
-          <a:ext cx="0" cy="0"/>
-          <a:chOff x="0" y="0"/>
-          <a:chExt cx="0" cy="0"/>
-        </a:xfrm>
-      </p:grpSpPr>
-      <p:sp>
-        <p:nvSpPr>
           <p:cNvPr id="56" name="PlaceHolder 1"/>
           <p:cNvSpPr>
             <a:spLocks noGrp="1"/>
@@ -327,15 +480,16 @@
           </a:prstGeom>
         </p:spPr>
         <p:txBody>
-          <a:bodyPr lIns="427320" rIns="427320" tIns="213480" bIns="213480"/>
-          <a:p>
-            <a:endParaRPr b="0" lang="en-US" sz="2000" spc="-1" strike="noStrike">
+          <a:bodyPr lIns="427320" tIns="213480" rIns="427320" bIns="213480"/>
+          <a:lstStyle/>
+          <a:p>
+            <a:endParaRPr lang="en-US" sz="2000" b="0" strike="noStrike" spc="-1">
               <a:solidFill>
                 <a:srgbClr val="000000"/>
               </a:solidFill>
               <a:uFill>
                 <a:solidFill>
-                  <a:srgbClr val="ffffff"/>
+                  <a:srgbClr val="FFFFFF"/>
                 </a:solidFill>
               </a:uFill>
               <a:latin typeface="Arial"/>
@@ -363,7 +517,8 @@
           </a:ln>
         </p:spPr>
         <p:txBody>
-          <a:bodyPr lIns="427320" rIns="427320" tIns="213480" bIns="213480" anchor="b"/>
+          <a:bodyPr lIns="427320" tIns="213480" rIns="427320" bIns="213480" anchor="b"/>
+          <a:lstStyle/>
           <a:p>
             <a:pPr algn="r">
               <a:lnSpc>
@@ -371,27 +526,27 @@
               </a:lnSpc>
             </a:pPr>
             <a:fld id="{30A7A8FE-85D9-4898-99D7-91ED097196DA}" type="slidenum">
-              <a:rPr b="0" lang="en-US" sz="5600" spc="-1" strike="noStrike">
+              <a:rPr lang="en-US" sz="5600" b="0" strike="noStrike" spc="-1">
                 <a:solidFill>
                   <a:srgbClr val="000000"/>
                 </a:solidFill>
                 <a:uFill>
                   <a:solidFill>
-                    <a:srgbClr val="ffffff"/>
+                    <a:srgbClr val="FFFFFF"/>
                   </a:solidFill>
                 </a:uFill>
                 <a:latin typeface="Arial"/>
                 <a:ea typeface="MS PGothic"/>
               </a:rPr>
-              <a:t>&lt;number&gt;</a:t>
+              <a:t>1</a:t>
             </a:fld>
-            <a:endParaRPr b="0" lang="en-US" sz="1400" spc="-1" strike="noStrike">
+            <a:endParaRPr lang="en-US" sz="1400" b="0" strike="noStrike" spc="-1">
               <a:solidFill>
                 <a:srgbClr val="000000"/>
               </a:solidFill>
               <a:uFill>
                 <a:solidFill>
-                  <a:srgbClr val="ffffff"/>
+                  <a:srgbClr val="FFFFFF"/>
                 </a:solidFill>
               </a:uFill>
               <a:latin typeface="Times New Roman"/>
@@ -401,11 +556,14 @@
       </p:sp>
     </p:spTree>
   </p:cSld>
+  <p:clrMapOvr>
+    <a:masterClrMapping/>
+  </p:clrMapOvr>
 </p:notes>
 </file>
 
 <file path=ppt/slideLayouts/slideLayout1.xml><?xml version="1.0" encoding="utf-8"?>
-<p:sldLayout xmlns:a="http://schemas.openxmlformats.org/drawingml/2006/main" xmlns:p="http://schemas.openxmlformats.org/presentationml/2006/main" xmlns:r="http://schemas.openxmlformats.org/officeDocument/2006/relationships" xmlns:p14="http://schemas.microsoft.com/office/powerpoint/2010/main" xmlns:p15="http://schemas.microsoft.com/office/powerpoint/2012/main" xmlns:mc="http://schemas.openxmlformats.org/markup-compatibility/2006" type="blank" preserve="1">
+<p:sldLayout xmlns:a="http://schemas.openxmlformats.org/drawingml/2006/main" xmlns:r="http://schemas.openxmlformats.org/officeDocument/2006/relationships" xmlns:p="http://schemas.openxmlformats.org/presentationml/2006/main" type="blank" preserve="1">
   <p:cSld name="Blank Slide">
     <p:spTree>
       <p:nvGrpSpPr>
@@ -423,11 +581,14 @@
       </p:grpSpPr>
     </p:spTree>
   </p:cSld>
+  <p:clrMapOvr>
+    <a:masterClrMapping/>
+  </p:clrMapOvr>
 </p:sldLayout>
 </file>
 
 <file path=ppt/slideLayouts/slideLayout10.xml><?xml version="1.0" encoding="utf-8"?>
-<p:sldLayout xmlns:a="http://schemas.openxmlformats.org/drawingml/2006/main" xmlns:p="http://schemas.openxmlformats.org/presentationml/2006/main" xmlns:r="http://schemas.openxmlformats.org/officeDocument/2006/relationships" xmlns:p14="http://schemas.microsoft.com/office/powerpoint/2010/main" xmlns:p15="http://schemas.microsoft.com/office/powerpoint/2012/main" xmlns:mc="http://schemas.openxmlformats.org/markup-compatibility/2006" type="objOverTx" preserve="1">
+<p:sldLayout xmlns:a="http://schemas.openxmlformats.org/drawingml/2006/main" xmlns:r="http://schemas.openxmlformats.org/officeDocument/2006/relationships" xmlns:p="http://schemas.openxmlformats.org/presentationml/2006/main" type="objOverTx" preserve="1">
   <p:cSld name="Title, Content over Content">
     <p:spTree>
       <p:nvGrpSpPr>
@@ -463,15 +624,16 @@
           </a:prstGeom>
         </p:spPr>
         <p:txBody>
-          <a:bodyPr lIns="0" rIns="0" tIns="0" bIns="0" anchor="ctr"/>
-          <a:p>
-            <a:endParaRPr b="0" lang="en-US" sz="8600" spc="-1" strike="noStrike">
-              <a:solidFill>
-                <a:srgbClr val="2f2b20"/>
-              </a:solidFill>
-              <a:uFill>
-                <a:solidFill>
-                  <a:srgbClr val="ffffff"/>
+          <a:bodyPr lIns="0" tIns="0" rIns="0" bIns="0" anchor="ctr"/>
+          <a:lstStyle/>
+          <a:p>
+            <a:endParaRPr lang="en-US" sz="8600" b="0" strike="noStrike" spc="-1">
+              <a:solidFill>
+                <a:srgbClr val="2F2B20"/>
+              </a:solidFill>
+              <a:uFill>
+                <a:solidFill>
+                  <a:srgbClr val="FFFFFF"/>
                 </a:solidFill>
               </a:uFill>
               <a:latin typeface="Arial"/>
@@ -499,15 +661,16 @@
           </a:prstGeom>
         </p:spPr>
         <p:txBody>
-          <a:bodyPr lIns="0" rIns="0" tIns="0" bIns="0"/>
-          <a:p>
-            <a:endParaRPr b="0" lang="en-US" sz="15300" spc="-1" strike="noStrike">
-              <a:solidFill>
-                <a:srgbClr val="2f2b20"/>
-              </a:solidFill>
-              <a:uFill>
-                <a:solidFill>
-                  <a:srgbClr val="ffffff"/>
+          <a:bodyPr lIns="0" tIns="0" rIns="0" bIns="0"/>
+          <a:lstStyle/>
+          <a:p>
+            <a:endParaRPr lang="en-US" sz="15300" b="0" strike="noStrike" spc="-1">
+              <a:solidFill>
+                <a:srgbClr val="2F2B20"/>
+              </a:solidFill>
+              <a:uFill>
+                <a:solidFill>
+                  <a:srgbClr val="FFFFFF"/>
                 </a:solidFill>
               </a:uFill>
               <a:latin typeface="Arial"/>
@@ -535,15 +698,16 @@
           </a:prstGeom>
         </p:spPr>
         <p:txBody>
-          <a:bodyPr lIns="0" rIns="0" tIns="0" bIns="0"/>
-          <a:p>
-            <a:endParaRPr b="0" lang="en-US" sz="15300" spc="-1" strike="noStrike">
-              <a:solidFill>
-                <a:srgbClr val="2f2b20"/>
-              </a:solidFill>
-              <a:uFill>
-                <a:solidFill>
-                  <a:srgbClr val="ffffff"/>
+          <a:bodyPr lIns="0" tIns="0" rIns="0" bIns="0"/>
+          <a:lstStyle/>
+          <a:p>
+            <a:endParaRPr lang="en-US" sz="15300" b="0" strike="noStrike" spc="-1">
+              <a:solidFill>
+                <a:srgbClr val="2F2B20"/>
+              </a:solidFill>
+              <a:uFill>
+                <a:solidFill>
+                  <a:srgbClr val="FFFFFF"/>
                 </a:solidFill>
               </a:uFill>
               <a:latin typeface="Arial"/>
@@ -553,11 +717,14 @@
       </p:sp>
     </p:spTree>
   </p:cSld>
+  <p:clrMapOvr>
+    <a:masterClrMapping/>
+  </p:clrMapOvr>
 </p:sldLayout>
 </file>
 
 <file path=ppt/slideLayouts/slideLayout11.xml><?xml version="1.0" encoding="utf-8"?>
-<p:sldLayout xmlns:a="http://schemas.openxmlformats.org/drawingml/2006/main" xmlns:p="http://schemas.openxmlformats.org/presentationml/2006/main" xmlns:r="http://schemas.openxmlformats.org/officeDocument/2006/relationships" xmlns:p14="http://schemas.microsoft.com/office/powerpoint/2010/main" xmlns:p15="http://schemas.microsoft.com/office/powerpoint/2012/main" xmlns:mc="http://schemas.openxmlformats.org/markup-compatibility/2006" type="fourObj" preserve="1">
+<p:sldLayout xmlns:a="http://schemas.openxmlformats.org/drawingml/2006/main" xmlns:r="http://schemas.openxmlformats.org/officeDocument/2006/relationships" xmlns:p="http://schemas.openxmlformats.org/presentationml/2006/main" type="fourObj" preserve="1">
   <p:cSld name="Title, 4 Content">
     <p:spTree>
       <p:nvGrpSpPr>
@@ -593,15 +760,16 @@
           </a:prstGeom>
         </p:spPr>
         <p:txBody>
-          <a:bodyPr lIns="0" rIns="0" tIns="0" bIns="0" anchor="ctr"/>
-          <a:p>
-            <a:endParaRPr b="0" lang="en-US" sz="8600" spc="-1" strike="noStrike">
-              <a:solidFill>
-                <a:srgbClr val="2f2b20"/>
-              </a:solidFill>
-              <a:uFill>
-                <a:solidFill>
-                  <a:srgbClr val="ffffff"/>
+          <a:bodyPr lIns="0" tIns="0" rIns="0" bIns="0" anchor="ctr"/>
+          <a:lstStyle/>
+          <a:p>
+            <a:endParaRPr lang="en-US" sz="8600" b="0" strike="noStrike" spc="-1">
+              <a:solidFill>
+                <a:srgbClr val="2F2B20"/>
+              </a:solidFill>
+              <a:uFill>
+                <a:solidFill>
+                  <a:srgbClr val="FFFFFF"/>
                 </a:solidFill>
               </a:uFill>
               <a:latin typeface="Arial"/>
@@ -629,15 +797,16 @@
           </a:prstGeom>
         </p:spPr>
         <p:txBody>
-          <a:bodyPr lIns="0" rIns="0" tIns="0" bIns="0"/>
-          <a:p>
-            <a:endParaRPr b="0" lang="en-US" sz="15300" spc="-1" strike="noStrike">
-              <a:solidFill>
-                <a:srgbClr val="2f2b20"/>
-              </a:solidFill>
-              <a:uFill>
-                <a:solidFill>
-                  <a:srgbClr val="ffffff"/>
+          <a:bodyPr lIns="0" tIns="0" rIns="0" bIns="0"/>
+          <a:lstStyle/>
+          <a:p>
+            <a:endParaRPr lang="en-US" sz="15300" b="0" strike="noStrike" spc="-1">
+              <a:solidFill>
+                <a:srgbClr val="2F2B20"/>
+              </a:solidFill>
+              <a:uFill>
+                <a:solidFill>
+                  <a:srgbClr val="FFFFFF"/>
                 </a:solidFill>
               </a:uFill>
               <a:latin typeface="Arial"/>
@@ -665,15 +834,16 @@
           </a:prstGeom>
         </p:spPr>
         <p:txBody>
-          <a:bodyPr lIns="0" rIns="0" tIns="0" bIns="0"/>
-          <a:p>
-            <a:endParaRPr b="0" lang="en-US" sz="15300" spc="-1" strike="noStrike">
-              <a:solidFill>
-                <a:srgbClr val="2f2b20"/>
-              </a:solidFill>
-              <a:uFill>
-                <a:solidFill>
-                  <a:srgbClr val="ffffff"/>
+          <a:bodyPr lIns="0" tIns="0" rIns="0" bIns="0"/>
+          <a:lstStyle/>
+          <a:p>
+            <a:endParaRPr lang="en-US" sz="15300" b="0" strike="noStrike" spc="-1">
+              <a:solidFill>
+                <a:srgbClr val="2F2B20"/>
+              </a:solidFill>
+              <a:uFill>
+                <a:solidFill>
+                  <a:srgbClr val="FFFFFF"/>
                 </a:solidFill>
               </a:uFill>
               <a:latin typeface="Arial"/>
@@ -701,15 +871,16 @@
           </a:prstGeom>
         </p:spPr>
         <p:txBody>
-          <a:bodyPr lIns="0" rIns="0" tIns="0" bIns="0"/>
-          <a:p>
-            <a:endParaRPr b="0" lang="en-US" sz="15300" spc="-1" strike="noStrike">
-              <a:solidFill>
-                <a:srgbClr val="2f2b20"/>
-              </a:solidFill>
-              <a:uFill>
-                <a:solidFill>
-                  <a:srgbClr val="ffffff"/>
+          <a:bodyPr lIns="0" tIns="0" rIns="0" bIns="0"/>
+          <a:lstStyle/>
+          <a:p>
+            <a:endParaRPr lang="en-US" sz="15300" b="0" strike="noStrike" spc="-1">
+              <a:solidFill>
+                <a:srgbClr val="2F2B20"/>
+              </a:solidFill>
+              <a:uFill>
+                <a:solidFill>
+                  <a:srgbClr val="FFFFFF"/>
                 </a:solidFill>
               </a:uFill>
               <a:latin typeface="Arial"/>
@@ -737,15 +908,16 @@
           </a:prstGeom>
         </p:spPr>
         <p:txBody>
-          <a:bodyPr lIns="0" rIns="0" tIns="0" bIns="0"/>
-          <a:p>
-            <a:endParaRPr b="0" lang="en-US" sz="15300" spc="-1" strike="noStrike">
-              <a:solidFill>
-                <a:srgbClr val="2f2b20"/>
-              </a:solidFill>
-              <a:uFill>
-                <a:solidFill>
-                  <a:srgbClr val="ffffff"/>
+          <a:bodyPr lIns="0" tIns="0" rIns="0" bIns="0"/>
+          <a:lstStyle/>
+          <a:p>
+            <a:endParaRPr lang="en-US" sz="15300" b="0" strike="noStrike" spc="-1">
+              <a:solidFill>
+                <a:srgbClr val="2F2B20"/>
+              </a:solidFill>
+              <a:uFill>
+                <a:solidFill>
+                  <a:srgbClr val="FFFFFF"/>
                 </a:solidFill>
               </a:uFill>
               <a:latin typeface="Arial"/>
@@ -755,11 +927,14 @@
       </p:sp>
     </p:spTree>
   </p:cSld>
+  <p:clrMapOvr>
+    <a:masterClrMapping/>
+  </p:clrMapOvr>
 </p:sldLayout>
 </file>
 
 <file path=ppt/slideLayouts/slideLayout12.xml><?xml version="1.0" encoding="utf-8"?>
-<p:sldLayout xmlns:a="http://schemas.openxmlformats.org/drawingml/2006/main" xmlns:p="http://schemas.openxmlformats.org/presentationml/2006/main" xmlns:r="http://schemas.openxmlformats.org/officeDocument/2006/relationships" xmlns:p14="http://schemas.microsoft.com/office/powerpoint/2010/main" xmlns:p15="http://schemas.microsoft.com/office/powerpoint/2012/main" xmlns:mc="http://schemas.openxmlformats.org/markup-compatibility/2006" type="blank" preserve="1">
+<p:sldLayout xmlns:a="http://schemas.openxmlformats.org/drawingml/2006/main" xmlns:r="http://schemas.openxmlformats.org/officeDocument/2006/relationships" xmlns:p="http://schemas.openxmlformats.org/presentationml/2006/main" type="blank" preserve="1">
   <p:cSld name="Title, 6 Content">
     <p:spTree>
       <p:nvGrpSpPr>
@@ -795,15 +970,16 @@
           </a:prstGeom>
         </p:spPr>
         <p:txBody>
-          <a:bodyPr lIns="0" rIns="0" tIns="0" bIns="0" anchor="ctr"/>
-          <a:p>
-            <a:endParaRPr b="0" lang="en-US" sz="8600" spc="-1" strike="noStrike">
-              <a:solidFill>
-                <a:srgbClr val="2f2b20"/>
-              </a:solidFill>
-              <a:uFill>
-                <a:solidFill>
-                  <a:srgbClr val="ffffff"/>
+          <a:bodyPr lIns="0" tIns="0" rIns="0" bIns="0" anchor="ctr"/>
+          <a:lstStyle/>
+          <a:p>
+            <a:endParaRPr lang="en-US" sz="8600" b="0" strike="noStrike" spc="-1">
+              <a:solidFill>
+                <a:srgbClr val="2F2B20"/>
+              </a:solidFill>
+              <a:uFill>
+                <a:solidFill>
+                  <a:srgbClr val="FFFFFF"/>
                 </a:solidFill>
               </a:uFill>
               <a:latin typeface="Arial"/>
@@ -831,15 +1007,16 @@
           </a:prstGeom>
         </p:spPr>
         <p:txBody>
-          <a:bodyPr lIns="0" rIns="0" tIns="0" bIns="0"/>
-          <a:p>
-            <a:endParaRPr b="0" lang="en-US" sz="15300" spc="-1" strike="noStrike">
-              <a:solidFill>
-                <a:srgbClr val="2f2b20"/>
-              </a:solidFill>
-              <a:uFill>
-                <a:solidFill>
-                  <a:srgbClr val="ffffff"/>
+          <a:bodyPr lIns="0" tIns="0" rIns="0" bIns="0"/>
+          <a:lstStyle/>
+          <a:p>
+            <a:endParaRPr lang="en-US" sz="15300" b="0" strike="noStrike" spc="-1">
+              <a:solidFill>
+                <a:srgbClr val="2F2B20"/>
+              </a:solidFill>
+              <a:uFill>
+                <a:solidFill>
+                  <a:srgbClr val="FFFFFF"/>
                 </a:solidFill>
               </a:uFill>
               <a:latin typeface="Arial"/>
@@ -867,15 +1044,16 @@
           </a:prstGeom>
         </p:spPr>
         <p:txBody>
-          <a:bodyPr lIns="0" rIns="0" tIns="0" bIns="0"/>
-          <a:p>
-            <a:endParaRPr b="0" lang="en-US" sz="15300" spc="-1" strike="noStrike">
-              <a:solidFill>
-                <a:srgbClr val="2f2b20"/>
-              </a:solidFill>
-              <a:uFill>
-                <a:solidFill>
-                  <a:srgbClr val="ffffff"/>
+          <a:bodyPr lIns="0" tIns="0" rIns="0" bIns="0"/>
+          <a:lstStyle/>
+          <a:p>
+            <a:endParaRPr lang="en-US" sz="15300" b="0" strike="noStrike" spc="-1">
+              <a:solidFill>
+                <a:srgbClr val="2F2B20"/>
+              </a:solidFill>
+              <a:uFill>
+                <a:solidFill>
+                  <a:srgbClr val="FFFFFF"/>
                 </a:solidFill>
               </a:uFill>
               <a:latin typeface="Arial"/>
@@ -885,7 +1063,7 @@
       </p:sp>
       <p:pic>
         <p:nvPicPr>
-          <p:cNvPr id="35" name="" descr=""/>
+          <p:cNvPr id="35" name="Picture 34"/>
           <p:cNvPicPr/>
           <p:nvPr/>
         </p:nvPicPr>
@@ -908,12 +1086,12 @@
       </p:pic>
       <p:pic>
         <p:nvPicPr>
-          <p:cNvPr id="36" name="" descr=""/>
+          <p:cNvPr id="36" name="Picture 35"/>
           <p:cNvPicPr/>
           <p:nvPr/>
         </p:nvPicPr>
         <p:blipFill>
-          <a:blip r:embed="rId3"/>
+          <a:blip r:embed="rId2"/>
           <a:stretch/>
         </p:blipFill>
         <p:spPr>
@@ -931,11 +1109,14 @@
       </p:pic>
     </p:spTree>
   </p:cSld>
+  <p:clrMapOvr>
+    <a:masterClrMapping/>
+  </p:clrMapOvr>
 </p:sldLayout>
 </file>
 
 <file path=ppt/slideLayouts/slideLayout2.xml><?xml version="1.0" encoding="utf-8"?>
-<p:sldLayout xmlns:a="http://schemas.openxmlformats.org/drawingml/2006/main" xmlns:p="http://schemas.openxmlformats.org/presentationml/2006/main" xmlns:r="http://schemas.openxmlformats.org/officeDocument/2006/relationships" xmlns:p14="http://schemas.microsoft.com/office/powerpoint/2010/main" xmlns:p15="http://schemas.microsoft.com/office/powerpoint/2012/main" xmlns:mc="http://schemas.openxmlformats.org/markup-compatibility/2006" type="tx" preserve="1">
+<p:sldLayout xmlns:a="http://schemas.openxmlformats.org/drawingml/2006/main" xmlns:r="http://schemas.openxmlformats.org/officeDocument/2006/relationships" xmlns:p="http://schemas.openxmlformats.org/presentationml/2006/main" type="tx" preserve="1">
   <p:cSld name="Title Slide">
     <p:spTree>
       <p:nvGrpSpPr>
@@ -971,15 +1152,16 @@
           </a:prstGeom>
         </p:spPr>
         <p:txBody>
-          <a:bodyPr lIns="0" rIns="0" tIns="0" bIns="0" anchor="ctr"/>
-          <a:p>
-            <a:endParaRPr b="0" lang="en-US" sz="8600" spc="-1" strike="noStrike">
-              <a:solidFill>
-                <a:srgbClr val="2f2b20"/>
-              </a:solidFill>
-              <a:uFill>
-                <a:solidFill>
-                  <a:srgbClr val="ffffff"/>
+          <a:bodyPr lIns="0" tIns="0" rIns="0" bIns="0" anchor="ctr"/>
+          <a:lstStyle/>
+          <a:p>
+            <a:endParaRPr lang="en-US" sz="8600" b="0" strike="noStrike" spc="-1">
+              <a:solidFill>
+                <a:srgbClr val="2F2B20"/>
+              </a:solidFill>
+              <a:uFill>
+                <a:solidFill>
+                  <a:srgbClr val="FFFFFF"/>
                 </a:solidFill>
               </a:uFill>
               <a:latin typeface="Arial"/>
@@ -1007,16 +1189,17 @@
           </a:prstGeom>
         </p:spPr>
         <p:txBody>
-          <a:bodyPr lIns="0" rIns="0" tIns="0" bIns="0" anchor="ctr"/>
+          <a:bodyPr lIns="0" tIns="0" rIns="0" bIns="0" anchor="ctr"/>
+          <a:lstStyle/>
           <a:p>
             <a:pPr algn="ctr"/>
-            <a:endParaRPr b="0" lang="en-US" sz="3200" spc="-1" strike="noStrike">
+            <a:endParaRPr lang="en-US" sz="3200" b="0" strike="noStrike" spc="-1">
               <a:solidFill>
                 <a:srgbClr val="000000"/>
               </a:solidFill>
               <a:uFill>
                 <a:solidFill>
-                  <a:srgbClr val="ffffff"/>
+                  <a:srgbClr val="FFFFFF"/>
                 </a:solidFill>
               </a:uFill>
               <a:latin typeface="Arial"/>
@@ -1026,11 +1209,14 @@
       </p:sp>
     </p:spTree>
   </p:cSld>
+  <p:clrMapOvr>
+    <a:masterClrMapping/>
+  </p:clrMapOvr>
 </p:sldLayout>
 </file>
 
 <file path=ppt/slideLayouts/slideLayout3.xml><?xml version="1.0" encoding="utf-8"?>
-<p:sldLayout xmlns:a="http://schemas.openxmlformats.org/drawingml/2006/main" xmlns:p="http://schemas.openxmlformats.org/presentationml/2006/main" xmlns:r="http://schemas.openxmlformats.org/officeDocument/2006/relationships" xmlns:p14="http://schemas.microsoft.com/office/powerpoint/2010/main" xmlns:p15="http://schemas.microsoft.com/office/powerpoint/2012/main" xmlns:mc="http://schemas.openxmlformats.org/markup-compatibility/2006" type="obj" preserve="1">
+<p:sldLayout xmlns:a="http://schemas.openxmlformats.org/drawingml/2006/main" xmlns:r="http://schemas.openxmlformats.org/officeDocument/2006/relationships" xmlns:p="http://schemas.openxmlformats.org/presentationml/2006/main" type="obj" preserve="1">
   <p:cSld name="Title, Content">
     <p:spTree>
       <p:nvGrpSpPr>
@@ -1066,15 +1252,16 @@
           </a:prstGeom>
         </p:spPr>
         <p:txBody>
-          <a:bodyPr lIns="0" rIns="0" tIns="0" bIns="0" anchor="ctr"/>
-          <a:p>
-            <a:endParaRPr b="0" lang="en-US" sz="8600" spc="-1" strike="noStrike">
-              <a:solidFill>
-                <a:srgbClr val="2f2b20"/>
-              </a:solidFill>
-              <a:uFill>
-                <a:solidFill>
-                  <a:srgbClr val="ffffff"/>
+          <a:bodyPr lIns="0" tIns="0" rIns="0" bIns="0" anchor="ctr"/>
+          <a:lstStyle/>
+          <a:p>
+            <a:endParaRPr lang="en-US" sz="8600" b="0" strike="noStrike" spc="-1">
+              <a:solidFill>
+                <a:srgbClr val="2F2B20"/>
+              </a:solidFill>
+              <a:uFill>
+                <a:solidFill>
+                  <a:srgbClr val="FFFFFF"/>
                 </a:solidFill>
               </a:uFill>
               <a:latin typeface="Arial"/>
@@ -1102,15 +1289,16 @@
           </a:prstGeom>
         </p:spPr>
         <p:txBody>
-          <a:bodyPr lIns="0" rIns="0" tIns="0" bIns="0"/>
-          <a:p>
-            <a:endParaRPr b="0" lang="en-US" sz="15300" spc="-1" strike="noStrike">
-              <a:solidFill>
-                <a:srgbClr val="2f2b20"/>
-              </a:solidFill>
-              <a:uFill>
-                <a:solidFill>
-                  <a:srgbClr val="ffffff"/>
+          <a:bodyPr lIns="0" tIns="0" rIns="0" bIns="0"/>
+          <a:lstStyle/>
+          <a:p>
+            <a:endParaRPr lang="en-US" sz="15300" b="0" strike="noStrike" spc="-1">
+              <a:solidFill>
+                <a:srgbClr val="2F2B20"/>
+              </a:solidFill>
+              <a:uFill>
+                <a:solidFill>
+                  <a:srgbClr val="FFFFFF"/>
                 </a:solidFill>
               </a:uFill>
               <a:latin typeface="Arial"/>
@@ -1120,11 +1308,14 @@
       </p:sp>
     </p:spTree>
   </p:cSld>
+  <p:clrMapOvr>
+    <a:masterClrMapping/>
+  </p:clrMapOvr>
 </p:sldLayout>
 </file>
 
 <file path=ppt/slideLayouts/slideLayout4.xml><?xml version="1.0" encoding="utf-8"?>
-<p:sldLayout xmlns:a="http://schemas.openxmlformats.org/drawingml/2006/main" xmlns:p="http://schemas.openxmlformats.org/presentationml/2006/main" xmlns:r="http://schemas.openxmlformats.org/officeDocument/2006/relationships" xmlns:p14="http://schemas.microsoft.com/office/powerpoint/2010/main" xmlns:p15="http://schemas.microsoft.com/office/powerpoint/2012/main" xmlns:mc="http://schemas.openxmlformats.org/markup-compatibility/2006" type="twoObj" preserve="1">
+<p:sldLayout xmlns:a="http://schemas.openxmlformats.org/drawingml/2006/main" xmlns:r="http://schemas.openxmlformats.org/officeDocument/2006/relationships" xmlns:p="http://schemas.openxmlformats.org/presentationml/2006/main" type="twoObj" preserve="1">
   <p:cSld name="Title, 2 Content">
     <p:spTree>
       <p:nvGrpSpPr>
@@ -1160,15 +1351,16 @@
           </a:prstGeom>
         </p:spPr>
         <p:txBody>
-          <a:bodyPr lIns="0" rIns="0" tIns="0" bIns="0" anchor="ctr"/>
-          <a:p>
-            <a:endParaRPr b="0" lang="en-US" sz="8600" spc="-1" strike="noStrike">
-              <a:solidFill>
-                <a:srgbClr val="2f2b20"/>
-              </a:solidFill>
-              <a:uFill>
-                <a:solidFill>
-                  <a:srgbClr val="ffffff"/>
+          <a:bodyPr lIns="0" tIns="0" rIns="0" bIns="0" anchor="ctr"/>
+          <a:lstStyle/>
+          <a:p>
+            <a:endParaRPr lang="en-US" sz="8600" b="0" strike="noStrike" spc="-1">
+              <a:solidFill>
+                <a:srgbClr val="2F2B20"/>
+              </a:solidFill>
+              <a:uFill>
+                <a:solidFill>
+                  <a:srgbClr val="FFFFFF"/>
                 </a:solidFill>
               </a:uFill>
               <a:latin typeface="Arial"/>
@@ -1196,15 +1388,16 @@
           </a:prstGeom>
         </p:spPr>
         <p:txBody>
-          <a:bodyPr lIns="0" rIns="0" tIns="0" bIns="0"/>
-          <a:p>
-            <a:endParaRPr b="0" lang="en-US" sz="15300" spc="-1" strike="noStrike">
-              <a:solidFill>
-                <a:srgbClr val="2f2b20"/>
-              </a:solidFill>
-              <a:uFill>
-                <a:solidFill>
-                  <a:srgbClr val="ffffff"/>
+          <a:bodyPr lIns="0" tIns="0" rIns="0" bIns="0"/>
+          <a:lstStyle/>
+          <a:p>
+            <a:endParaRPr lang="en-US" sz="15300" b="0" strike="noStrike" spc="-1">
+              <a:solidFill>
+                <a:srgbClr val="2F2B20"/>
+              </a:solidFill>
+              <a:uFill>
+                <a:solidFill>
+                  <a:srgbClr val="FFFFFF"/>
                 </a:solidFill>
               </a:uFill>
               <a:latin typeface="Arial"/>
@@ -1232,15 +1425,16 @@
           </a:prstGeom>
         </p:spPr>
         <p:txBody>
-          <a:bodyPr lIns="0" rIns="0" tIns="0" bIns="0"/>
-          <a:p>
-            <a:endParaRPr b="0" lang="en-US" sz="15300" spc="-1" strike="noStrike">
-              <a:solidFill>
-                <a:srgbClr val="2f2b20"/>
-              </a:solidFill>
-              <a:uFill>
-                <a:solidFill>
-                  <a:srgbClr val="ffffff"/>
+          <a:bodyPr lIns="0" tIns="0" rIns="0" bIns="0"/>
+          <a:lstStyle/>
+          <a:p>
+            <a:endParaRPr lang="en-US" sz="15300" b="0" strike="noStrike" spc="-1">
+              <a:solidFill>
+                <a:srgbClr val="2F2B20"/>
+              </a:solidFill>
+              <a:uFill>
+                <a:solidFill>
+                  <a:srgbClr val="FFFFFF"/>
                 </a:solidFill>
               </a:uFill>
               <a:latin typeface="Arial"/>
@@ -1250,11 +1444,14 @@
       </p:sp>
     </p:spTree>
   </p:cSld>
+  <p:clrMapOvr>
+    <a:masterClrMapping/>
+  </p:clrMapOvr>
 </p:sldLayout>
 </file>
 
 <file path=ppt/slideLayouts/slideLayout5.xml><?xml version="1.0" encoding="utf-8"?>
-<p:sldLayout xmlns:a="http://schemas.openxmlformats.org/drawingml/2006/main" xmlns:p="http://schemas.openxmlformats.org/presentationml/2006/main" xmlns:r="http://schemas.openxmlformats.org/officeDocument/2006/relationships" xmlns:p14="http://schemas.microsoft.com/office/powerpoint/2010/main" xmlns:p15="http://schemas.microsoft.com/office/powerpoint/2012/main" xmlns:mc="http://schemas.openxmlformats.org/markup-compatibility/2006" type="titleOnly" preserve="1">
+<p:sldLayout xmlns:a="http://schemas.openxmlformats.org/drawingml/2006/main" xmlns:r="http://schemas.openxmlformats.org/officeDocument/2006/relationships" xmlns:p="http://schemas.openxmlformats.org/presentationml/2006/main" type="titleOnly" preserve="1">
   <p:cSld name="Title Only">
     <p:spTree>
       <p:nvGrpSpPr>
@@ -1290,15 +1487,16 @@
           </a:prstGeom>
         </p:spPr>
         <p:txBody>
-          <a:bodyPr lIns="0" rIns="0" tIns="0" bIns="0" anchor="ctr"/>
-          <a:p>
-            <a:endParaRPr b="0" lang="en-US" sz="8600" spc="-1" strike="noStrike">
-              <a:solidFill>
-                <a:srgbClr val="2f2b20"/>
-              </a:solidFill>
-              <a:uFill>
-                <a:solidFill>
-                  <a:srgbClr val="ffffff"/>
+          <a:bodyPr lIns="0" tIns="0" rIns="0" bIns="0" anchor="ctr"/>
+          <a:lstStyle/>
+          <a:p>
+            <a:endParaRPr lang="en-US" sz="8600" b="0" strike="noStrike" spc="-1">
+              <a:solidFill>
+                <a:srgbClr val="2F2B20"/>
+              </a:solidFill>
+              <a:uFill>
+                <a:solidFill>
+                  <a:srgbClr val="FFFFFF"/>
                 </a:solidFill>
               </a:uFill>
               <a:latin typeface="Arial"/>
@@ -1308,11 +1506,14 @@
       </p:sp>
     </p:spTree>
   </p:cSld>
+  <p:clrMapOvr>
+    <a:masterClrMapping/>
+  </p:clrMapOvr>
 </p:sldLayout>
 </file>
 
 <file path=ppt/slideLayouts/slideLayout6.xml><?xml version="1.0" encoding="utf-8"?>
-<p:sldLayout xmlns:a="http://schemas.openxmlformats.org/drawingml/2006/main" xmlns:p="http://schemas.openxmlformats.org/presentationml/2006/main" xmlns:r="http://schemas.openxmlformats.org/officeDocument/2006/relationships" xmlns:p14="http://schemas.microsoft.com/office/powerpoint/2010/main" xmlns:p15="http://schemas.microsoft.com/office/powerpoint/2012/main" xmlns:mc="http://schemas.openxmlformats.org/markup-compatibility/2006" type="objOnly" preserve="1">
+<p:sldLayout xmlns:a="http://schemas.openxmlformats.org/drawingml/2006/main" xmlns:r="http://schemas.openxmlformats.org/officeDocument/2006/relationships" xmlns:p="http://schemas.openxmlformats.org/presentationml/2006/main" type="objOnly" preserve="1">
   <p:cSld name="Centered Text">
     <p:spTree>
       <p:nvGrpSpPr>
@@ -1348,16 +1549,17 @@
           </a:prstGeom>
         </p:spPr>
         <p:txBody>
-          <a:bodyPr lIns="0" rIns="0" tIns="0" bIns="0" anchor="ctr"/>
+          <a:bodyPr lIns="0" tIns="0" rIns="0" bIns="0" anchor="ctr"/>
+          <a:lstStyle/>
           <a:p>
             <a:pPr algn="ctr"/>
-            <a:endParaRPr b="0" lang="en-US" sz="3200" spc="-1" strike="noStrike">
+            <a:endParaRPr lang="en-US" sz="3200" b="0" strike="noStrike" spc="-1">
               <a:solidFill>
                 <a:srgbClr val="000000"/>
               </a:solidFill>
               <a:uFill>
                 <a:solidFill>
-                  <a:srgbClr val="ffffff"/>
+                  <a:srgbClr val="FFFFFF"/>
                 </a:solidFill>
               </a:uFill>
               <a:latin typeface="Arial"/>
@@ -1367,11 +1569,14 @@
       </p:sp>
     </p:spTree>
   </p:cSld>
+  <p:clrMapOvr>
+    <a:masterClrMapping/>
+  </p:clrMapOvr>
 </p:sldLayout>
 </file>
 
 <file path=ppt/slideLayouts/slideLayout7.xml><?xml version="1.0" encoding="utf-8"?>
-<p:sldLayout xmlns:a="http://schemas.openxmlformats.org/drawingml/2006/main" xmlns:p="http://schemas.openxmlformats.org/presentationml/2006/main" xmlns:r="http://schemas.openxmlformats.org/officeDocument/2006/relationships" xmlns:p14="http://schemas.microsoft.com/office/powerpoint/2010/main" xmlns:p15="http://schemas.microsoft.com/office/powerpoint/2012/main" xmlns:mc="http://schemas.openxmlformats.org/markup-compatibility/2006" type="twoObjAndObj" preserve="1">
+<p:sldLayout xmlns:a="http://schemas.openxmlformats.org/drawingml/2006/main" xmlns:r="http://schemas.openxmlformats.org/officeDocument/2006/relationships" xmlns:p="http://schemas.openxmlformats.org/presentationml/2006/main" type="twoObjAndObj" preserve="1">
   <p:cSld name="Title, 2 Content and Content">
     <p:spTree>
       <p:nvGrpSpPr>
@@ -1407,15 +1612,16 @@
           </a:prstGeom>
         </p:spPr>
         <p:txBody>
-          <a:bodyPr lIns="0" rIns="0" tIns="0" bIns="0" anchor="ctr"/>
-          <a:p>
-            <a:endParaRPr b="0" lang="en-US" sz="8600" spc="-1" strike="noStrike">
-              <a:solidFill>
-                <a:srgbClr val="2f2b20"/>
-              </a:solidFill>
-              <a:uFill>
-                <a:solidFill>
-                  <a:srgbClr val="ffffff"/>
+          <a:bodyPr lIns="0" tIns="0" rIns="0" bIns="0" anchor="ctr"/>
+          <a:lstStyle/>
+          <a:p>
+            <a:endParaRPr lang="en-US" sz="8600" b="0" strike="noStrike" spc="-1">
+              <a:solidFill>
+                <a:srgbClr val="2F2B20"/>
+              </a:solidFill>
+              <a:uFill>
+                <a:solidFill>
+                  <a:srgbClr val="FFFFFF"/>
                 </a:solidFill>
               </a:uFill>
               <a:latin typeface="Arial"/>
@@ -1443,15 +1649,16 @@
           </a:prstGeom>
         </p:spPr>
         <p:txBody>
-          <a:bodyPr lIns="0" rIns="0" tIns="0" bIns="0"/>
-          <a:p>
-            <a:endParaRPr b="0" lang="en-US" sz="15300" spc="-1" strike="noStrike">
-              <a:solidFill>
-                <a:srgbClr val="2f2b20"/>
-              </a:solidFill>
-              <a:uFill>
-                <a:solidFill>
-                  <a:srgbClr val="ffffff"/>
+          <a:bodyPr lIns="0" tIns="0" rIns="0" bIns="0"/>
+          <a:lstStyle/>
+          <a:p>
+            <a:endParaRPr lang="en-US" sz="15300" b="0" strike="noStrike" spc="-1">
+              <a:solidFill>
+                <a:srgbClr val="2F2B20"/>
+              </a:solidFill>
+              <a:uFill>
+                <a:solidFill>
+                  <a:srgbClr val="FFFFFF"/>
                 </a:solidFill>
               </a:uFill>
               <a:latin typeface="Arial"/>
@@ -1479,15 +1686,16 @@
           </a:prstGeom>
         </p:spPr>
         <p:txBody>
-          <a:bodyPr lIns="0" rIns="0" tIns="0" bIns="0"/>
-          <a:p>
-            <a:endParaRPr b="0" lang="en-US" sz="15300" spc="-1" strike="noStrike">
-              <a:solidFill>
-                <a:srgbClr val="2f2b20"/>
-              </a:solidFill>
-              <a:uFill>
-                <a:solidFill>
-                  <a:srgbClr val="ffffff"/>
+          <a:bodyPr lIns="0" tIns="0" rIns="0" bIns="0"/>
+          <a:lstStyle/>
+          <a:p>
+            <a:endParaRPr lang="en-US" sz="15300" b="0" strike="noStrike" spc="-1">
+              <a:solidFill>
+                <a:srgbClr val="2F2B20"/>
+              </a:solidFill>
+              <a:uFill>
+                <a:solidFill>
+                  <a:srgbClr val="FFFFFF"/>
                 </a:solidFill>
               </a:uFill>
               <a:latin typeface="Arial"/>
@@ -1515,15 +1723,16 @@
           </a:prstGeom>
         </p:spPr>
         <p:txBody>
-          <a:bodyPr lIns="0" rIns="0" tIns="0" bIns="0"/>
-          <a:p>
-            <a:endParaRPr b="0" lang="en-US" sz="15300" spc="-1" strike="noStrike">
-              <a:solidFill>
-                <a:srgbClr val="2f2b20"/>
-              </a:solidFill>
-              <a:uFill>
-                <a:solidFill>
-                  <a:srgbClr val="ffffff"/>
+          <a:bodyPr lIns="0" tIns="0" rIns="0" bIns="0"/>
+          <a:lstStyle/>
+          <a:p>
+            <a:endParaRPr lang="en-US" sz="15300" b="0" strike="noStrike" spc="-1">
+              <a:solidFill>
+                <a:srgbClr val="2F2B20"/>
+              </a:solidFill>
+              <a:uFill>
+                <a:solidFill>
+                  <a:srgbClr val="FFFFFF"/>
                 </a:solidFill>
               </a:uFill>
               <a:latin typeface="Arial"/>
@@ -1533,11 +1742,14 @@
       </p:sp>
     </p:spTree>
   </p:cSld>
+  <p:clrMapOvr>
+    <a:masterClrMapping/>
+  </p:clrMapOvr>
 </p:sldLayout>
 </file>
 
 <file path=ppt/slideLayouts/slideLayout8.xml><?xml version="1.0" encoding="utf-8"?>
-<p:sldLayout xmlns:a="http://schemas.openxmlformats.org/drawingml/2006/main" xmlns:p="http://schemas.openxmlformats.org/presentationml/2006/main" xmlns:r="http://schemas.openxmlformats.org/officeDocument/2006/relationships" xmlns:p14="http://schemas.microsoft.com/office/powerpoint/2010/main" xmlns:p15="http://schemas.microsoft.com/office/powerpoint/2012/main" xmlns:mc="http://schemas.openxmlformats.org/markup-compatibility/2006" type="objAndTwoObj" preserve="1">
+<p:sldLayout xmlns:a="http://schemas.openxmlformats.org/drawingml/2006/main" xmlns:r="http://schemas.openxmlformats.org/officeDocument/2006/relationships" xmlns:p="http://schemas.openxmlformats.org/presentationml/2006/main" type="objAndTwoObj" preserve="1">
   <p:cSld name="Title Content and 2 Content">
     <p:spTree>
       <p:nvGrpSpPr>
@@ -1573,15 +1785,16 @@
           </a:prstGeom>
         </p:spPr>
         <p:txBody>
-          <a:bodyPr lIns="0" rIns="0" tIns="0" bIns="0" anchor="ctr"/>
-          <a:p>
-            <a:endParaRPr b="0" lang="en-US" sz="8600" spc="-1" strike="noStrike">
-              <a:solidFill>
-                <a:srgbClr val="2f2b20"/>
-              </a:solidFill>
-              <a:uFill>
-                <a:solidFill>
-                  <a:srgbClr val="ffffff"/>
+          <a:bodyPr lIns="0" tIns="0" rIns="0" bIns="0" anchor="ctr"/>
+          <a:lstStyle/>
+          <a:p>
+            <a:endParaRPr lang="en-US" sz="8600" b="0" strike="noStrike" spc="-1">
+              <a:solidFill>
+                <a:srgbClr val="2F2B20"/>
+              </a:solidFill>
+              <a:uFill>
+                <a:solidFill>
+                  <a:srgbClr val="FFFFFF"/>
                 </a:solidFill>
               </a:uFill>
               <a:latin typeface="Arial"/>
@@ -1609,15 +1822,16 @@
           </a:prstGeom>
         </p:spPr>
         <p:txBody>
-          <a:bodyPr lIns="0" rIns="0" tIns="0" bIns="0"/>
-          <a:p>
-            <a:endParaRPr b="0" lang="en-US" sz="15300" spc="-1" strike="noStrike">
-              <a:solidFill>
-                <a:srgbClr val="2f2b20"/>
-              </a:solidFill>
-              <a:uFill>
-                <a:solidFill>
-                  <a:srgbClr val="ffffff"/>
+          <a:bodyPr lIns="0" tIns="0" rIns="0" bIns="0"/>
+          <a:lstStyle/>
+          <a:p>
+            <a:endParaRPr lang="en-US" sz="15300" b="0" strike="noStrike" spc="-1">
+              <a:solidFill>
+                <a:srgbClr val="2F2B20"/>
+              </a:solidFill>
+              <a:uFill>
+                <a:solidFill>
+                  <a:srgbClr val="FFFFFF"/>
                 </a:solidFill>
               </a:uFill>
               <a:latin typeface="Arial"/>
@@ -1645,15 +1859,16 @@
           </a:prstGeom>
         </p:spPr>
         <p:txBody>
-          <a:bodyPr lIns="0" rIns="0" tIns="0" bIns="0"/>
-          <a:p>
-            <a:endParaRPr b="0" lang="en-US" sz="15300" spc="-1" strike="noStrike">
-              <a:solidFill>
-                <a:srgbClr val="2f2b20"/>
-              </a:solidFill>
-              <a:uFill>
-                <a:solidFill>
-                  <a:srgbClr val="ffffff"/>
+          <a:bodyPr lIns="0" tIns="0" rIns="0" bIns="0"/>
+          <a:lstStyle/>
+          <a:p>
+            <a:endParaRPr lang="en-US" sz="15300" b="0" strike="noStrike" spc="-1">
+              <a:solidFill>
+                <a:srgbClr val="2F2B20"/>
+              </a:solidFill>
+              <a:uFill>
+                <a:solidFill>
+                  <a:srgbClr val="FFFFFF"/>
                 </a:solidFill>
               </a:uFill>
               <a:latin typeface="Arial"/>
@@ -1681,15 +1896,16 @@
           </a:prstGeom>
         </p:spPr>
         <p:txBody>
-          <a:bodyPr lIns="0" rIns="0" tIns="0" bIns="0"/>
-          <a:p>
-            <a:endParaRPr b="0" lang="en-US" sz="15300" spc="-1" strike="noStrike">
-              <a:solidFill>
-                <a:srgbClr val="2f2b20"/>
-              </a:solidFill>
-              <a:uFill>
-                <a:solidFill>
-                  <a:srgbClr val="ffffff"/>
+          <a:bodyPr lIns="0" tIns="0" rIns="0" bIns="0"/>
+          <a:lstStyle/>
+          <a:p>
+            <a:endParaRPr lang="en-US" sz="15300" b="0" strike="noStrike" spc="-1">
+              <a:solidFill>
+                <a:srgbClr val="2F2B20"/>
+              </a:solidFill>
+              <a:uFill>
+                <a:solidFill>
+                  <a:srgbClr val="FFFFFF"/>
                 </a:solidFill>
               </a:uFill>
               <a:latin typeface="Arial"/>
@@ -1699,11 +1915,14 @@
       </p:sp>
     </p:spTree>
   </p:cSld>
+  <p:clrMapOvr>
+    <a:masterClrMapping/>
+  </p:clrMapOvr>
 </p:sldLayout>
 </file>
 
 <file path=ppt/slideLayouts/slideLayout9.xml><?xml version="1.0" encoding="utf-8"?>
-<p:sldLayout xmlns:a="http://schemas.openxmlformats.org/drawingml/2006/main" xmlns:p="http://schemas.openxmlformats.org/presentationml/2006/main" xmlns:r="http://schemas.openxmlformats.org/officeDocument/2006/relationships" xmlns:p14="http://schemas.microsoft.com/office/powerpoint/2010/main" xmlns:p15="http://schemas.microsoft.com/office/powerpoint/2012/main" xmlns:mc="http://schemas.openxmlformats.org/markup-compatibility/2006" type="twoObjOverTx" preserve="1">
+<p:sldLayout xmlns:a="http://schemas.openxmlformats.org/drawingml/2006/main" xmlns:r="http://schemas.openxmlformats.org/officeDocument/2006/relationships" xmlns:p="http://schemas.openxmlformats.org/presentationml/2006/main" type="twoObjOverTx" preserve="1">
   <p:cSld name="Title, 2 Content over Content">
     <p:spTree>
       <p:nvGrpSpPr>
@@ -1739,15 +1958,16 @@
           </a:prstGeom>
         </p:spPr>
         <p:txBody>
-          <a:bodyPr lIns="0" rIns="0" tIns="0" bIns="0" anchor="ctr"/>
-          <a:p>
-            <a:endParaRPr b="0" lang="en-US" sz="8600" spc="-1" strike="noStrike">
-              <a:solidFill>
-                <a:srgbClr val="2f2b20"/>
-              </a:solidFill>
-              <a:uFill>
-                <a:solidFill>
-                  <a:srgbClr val="ffffff"/>
+          <a:bodyPr lIns="0" tIns="0" rIns="0" bIns="0" anchor="ctr"/>
+          <a:lstStyle/>
+          <a:p>
+            <a:endParaRPr lang="en-US" sz="8600" b="0" strike="noStrike" spc="-1">
+              <a:solidFill>
+                <a:srgbClr val="2F2B20"/>
+              </a:solidFill>
+              <a:uFill>
+                <a:solidFill>
+                  <a:srgbClr val="FFFFFF"/>
                 </a:solidFill>
               </a:uFill>
               <a:latin typeface="Arial"/>
@@ -1775,15 +1995,16 @@
           </a:prstGeom>
         </p:spPr>
         <p:txBody>
-          <a:bodyPr lIns="0" rIns="0" tIns="0" bIns="0"/>
-          <a:p>
-            <a:endParaRPr b="0" lang="en-US" sz="15300" spc="-1" strike="noStrike">
-              <a:solidFill>
-                <a:srgbClr val="2f2b20"/>
-              </a:solidFill>
-              <a:uFill>
-                <a:solidFill>
-                  <a:srgbClr val="ffffff"/>
+          <a:bodyPr lIns="0" tIns="0" rIns="0" bIns="0"/>
+          <a:lstStyle/>
+          <a:p>
+            <a:endParaRPr lang="en-US" sz="15300" b="0" strike="noStrike" spc="-1">
+              <a:solidFill>
+                <a:srgbClr val="2F2B20"/>
+              </a:solidFill>
+              <a:uFill>
+                <a:solidFill>
+                  <a:srgbClr val="FFFFFF"/>
                 </a:solidFill>
               </a:uFill>
               <a:latin typeface="Arial"/>
@@ -1811,15 +2032,16 @@
           </a:prstGeom>
         </p:spPr>
         <p:txBody>
-          <a:bodyPr lIns="0" rIns="0" tIns="0" bIns="0"/>
-          <a:p>
-            <a:endParaRPr b="0" lang="en-US" sz="15300" spc="-1" strike="noStrike">
-              <a:solidFill>
-                <a:srgbClr val="2f2b20"/>
-              </a:solidFill>
-              <a:uFill>
-                <a:solidFill>
-                  <a:srgbClr val="ffffff"/>
+          <a:bodyPr lIns="0" tIns="0" rIns="0" bIns="0"/>
+          <a:lstStyle/>
+          <a:p>
+            <a:endParaRPr lang="en-US" sz="15300" b="0" strike="noStrike" spc="-1">
+              <a:solidFill>
+                <a:srgbClr val="2F2B20"/>
+              </a:solidFill>
+              <a:uFill>
+                <a:solidFill>
+                  <a:srgbClr val="FFFFFF"/>
                 </a:solidFill>
               </a:uFill>
               <a:latin typeface="Arial"/>
@@ -1847,15 +2069,16 @@
           </a:prstGeom>
         </p:spPr>
         <p:txBody>
-          <a:bodyPr lIns="0" rIns="0" tIns="0" bIns="0"/>
-          <a:p>
-            <a:endParaRPr b="0" lang="en-US" sz="15300" spc="-1" strike="noStrike">
-              <a:solidFill>
-                <a:srgbClr val="2f2b20"/>
-              </a:solidFill>
-              <a:uFill>
-                <a:solidFill>
-                  <a:srgbClr val="ffffff"/>
+          <a:bodyPr lIns="0" tIns="0" rIns="0" bIns="0"/>
+          <a:lstStyle/>
+          <a:p>
+            <a:endParaRPr lang="en-US" sz="15300" b="0" strike="noStrike" spc="-1">
+              <a:solidFill>
+                <a:srgbClr val="2F2B20"/>
+              </a:solidFill>
+              <a:uFill>
+                <a:solidFill>
+                  <a:srgbClr val="FFFFFF"/>
                 </a:solidFill>
               </a:uFill>
               <a:latin typeface="Arial"/>
@@ -1865,17 +2088,21 @@
       </p:sp>
     </p:spTree>
   </p:cSld>
+  <p:clrMapOvr>
+    <a:masterClrMapping/>
+  </p:clrMapOvr>
 </p:sldLayout>
 </file>
 
 <file path=ppt/slideMasters/slideMaster1.xml><?xml version="1.0" encoding="utf-8"?>
-<p:sldMaster xmlns:a="http://schemas.openxmlformats.org/drawingml/2006/main" xmlns:p="http://schemas.openxmlformats.org/presentationml/2006/main" xmlns:r="http://schemas.openxmlformats.org/officeDocument/2006/relationships" xmlns:p14="http://schemas.microsoft.com/office/powerpoint/2010/main" xmlns:p15="http://schemas.microsoft.com/office/powerpoint/2012/main" xmlns:mc="http://schemas.openxmlformats.org/markup-compatibility/2006">
+<p:sldMaster xmlns:a="http://schemas.openxmlformats.org/drawingml/2006/main" xmlns:r="http://schemas.openxmlformats.org/officeDocument/2006/relationships" xmlns:p="http://schemas.openxmlformats.org/presentationml/2006/main">
   <p:cSld>
     <p:bg>
       <p:bgPr>
         <a:solidFill>
-          <a:srgbClr val="ffffff"/>
+          <a:srgbClr val="FFFFFF"/>
         </a:solidFill>
+        <a:effectLst/>
       </p:bgPr>
     </p:bg>
     <p:spTree>
@@ -1894,7 +2121,7 @@
       </p:grpSpPr>
       <p:sp>
         <p:nvSpPr>
-          <p:cNvPr id="0" name="PlaceHolder 1"/>
+          <p:cNvPr id="3" name="PlaceHolder 1"/>
           <p:cNvSpPr>
             <a:spLocks noGrp="1"/>
           </p:cNvSpPr>
@@ -1912,15 +2139,16 @@
           </a:prstGeom>
         </p:spPr>
         <p:txBody>
-          <a:bodyPr lIns="438840" rIns="438840" tIns="219600" bIns="219600"/>
-          <a:p>
-            <a:endParaRPr b="0" lang="en-US" sz="2400" spc="-1" strike="noStrike">
+          <a:bodyPr lIns="438840" tIns="219600" rIns="438840" bIns="219600"/>
+          <a:lstStyle/>
+          <a:p>
+            <a:endParaRPr lang="en-US" sz="2400" b="0" strike="noStrike" spc="-1">
               <a:solidFill>
                 <a:srgbClr val="000000"/>
               </a:solidFill>
               <a:uFill>
                 <a:solidFill>
-                  <a:srgbClr val="ffffff"/>
+                  <a:srgbClr val="FFFFFF"/>
                 </a:solidFill>
               </a:uFill>
               <a:latin typeface="Times New Roman"/>
@@ -1930,7 +2158,7 @@
       </p:sp>
       <p:sp>
         <p:nvSpPr>
-          <p:cNvPr id="1" name="PlaceHolder 2"/>
+          <p:cNvPr id="4" name="PlaceHolder 2"/>
           <p:cNvSpPr>
             <a:spLocks noGrp="1"/>
           </p:cNvSpPr>
@@ -1948,15 +2176,16 @@
           </a:prstGeom>
         </p:spPr>
         <p:txBody>
-          <a:bodyPr lIns="438840" rIns="438840" tIns="219600" bIns="219600"/>
-          <a:p>
-            <a:endParaRPr b="0" lang="en-US" sz="2400" spc="-1" strike="noStrike">
+          <a:bodyPr lIns="438840" tIns="219600" rIns="438840" bIns="219600"/>
+          <a:lstStyle/>
+          <a:p>
+            <a:endParaRPr lang="en-US" sz="2400" b="0" strike="noStrike" spc="-1">
               <a:solidFill>
                 <a:srgbClr val="000000"/>
               </a:solidFill>
               <a:uFill>
                 <a:solidFill>
-                  <a:srgbClr val="ffffff"/>
+                  <a:srgbClr val="FFFFFF"/>
                 </a:solidFill>
               </a:uFill>
               <a:latin typeface="Times New Roman"/>
@@ -1984,7 +2213,8 @@
           </a:prstGeom>
         </p:spPr>
         <p:txBody>
-          <a:bodyPr lIns="438840" rIns="438840" tIns="219600" bIns="219600"/>
+          <a:bodyPr lIns="438840" tIns="219600" rIns="438840" bIns="219600"/>
+          <a:lstStyle/>
           <a:p>
             <a:pPr algn="r">
               <a:lnSpc>
@@ -1992,27 +2222,27 @@
               </a:lnSpc>
             </a:pPr>
             <a:fld id="{F242A4B0-ED9C-4480-B498-C4565D9F10D5}" type="slidenum">
-              <a:rPr b="0" lang="en-US" sz="6700" spc="-1" strike="noStrike">
-                <a:solidFill>
-                  <a:srgbClr val="2f2b20"/>
+              <a:rPr lang="en-US" sz="6700" b="0" strike="noStrike" spc="-1">
+                <a:solidFill>
+                  <a:srgbClr val="2F2B20"/>
                 </a:solidFill>
                 <a:uFill>
                   <a:solidFill>
-                    <a:srgbClr val="ffffff"/>
+                    <a:srgbClr val="FFFFFF"/>
                   </a:solidFill>
                 </a:uFill>
                 <a:latin typeface="Arial"/>
                 <a:ea typeface="MS PGothic"/>
               </a:rPr>
-              <a:t>&lt;number&gt;</a:t>
+              <a:t>‹#›</a:t>
             </a:fld>
-            <a:endParaRPr b="0" lang="en-US" sz="1400" spc="-1" strike="noStrike">
+            <a:endParaRPr lang="en-US" sz="1400" b="0" strike="noStrike" spc="-1">
               <a:solidFill>
                 <a:srgbClr val="000000"/>
               </a:solidFill>
               <a:uFill>
                 <a:solidFill>
-                  <a:srgbClr val="ffffff"/>
+                  <a:srgbClr val="FFFFFF"/>
                 </a:solidFill>
               </a:uFill>
               <a:latin typeface="Times New Roman"/>
@@ -2022,26 +2252,306 @@
       </p:sp>
     </p:spTree>
   </p:cSld>
-  <p:clrMap bg1="lt1" bg2="lt2" tx1="dk1" tx2="dk2" accent1="accent1" accent2="accent2" accent3="accent3" accent4="accent4" accent5="accent5" accent6="accent6" hlink="hlink" folHlink="folHlink"/>
+  <p:clrMap bg1="lt1" tx1="dk1" bg2="lt2" tx2="dk2" accent1="accent1" accent2="accent2" accent3="accent3" accent4="accent4" accent5="accent5" accent6="accent6" hlink="hlink" folHlink="folHlink"/>
   <p:sldLayoutIdLst>
-    <p:sldLayoutId id="2147483649" r:id="rId2"/>
-    <p:sldLayoutId id="2147483650" r:id="rId3"/>
-    <p:sldLayoutId id="2147483651" r:id="rId4"/>
-    <p:sldLayoutId id="2147483652" r:id="rId5"/>
-    <p:sldLayoutId id="2147483653" r:id="rId6"/>
-    <p:sldLayoutId id="2147483654" r:id="rId7"/>
-    <p:sldLayoutId id="2147483655" r:id="rId8"/>
-    <p:sldLayoutId id="2147483656" r:id="rId9"/>
-    <p:sldLayoutId id="2147483657" r:id="rId10"/>
-    <p:sldLayoutId id="2147483658" r:id="rId11"/>
-    <p:sldLayoutId id="2147483659" r:id="rId12"/>
-    <p:sldLayoutId id="2147483660" r:id="rId13"/>
+    <p:sldLayoutId id="2147483649" r:id="rId1"/>
+    <p:sldLayoutId id="2147483650" r:id="rId2"/>
+    <p:sldLayoutId id="2147483651" r:id="rId3"/>
+    <p:sldLayoutId id="2147483652" r:id="rId4"/>
+    <p:sldLayoutId id="2147483653" r:id="rId5"/>
+    <p:sldLayoutId id="2147483654" r:id="rId6"/>
+    <p:sldLayoutId id="2147483655" r:id="rId7"/>
+    <p:sldLayoutId id="2147483656" r:id="rId8"/>
+    <p:sldLayoutId id="2147483657" r:id="rId9"/>
+    <p:sldLayoutId id="2147483658" r:id="rId10"/>
+    <p:sldLayoutId id="2147483659" r:id="rId11"/>
+    <p:sldLayoutId id="2147483660" r:id="rId12"/>
   </p:sldLayoutIdLst>
+  <p:txStyles>
+    <p:titleStyle>
+      <a:lvl1pPr algn="l" defTabSz="914400" rtl="0" eaLnBrk="1" latinLnBrk="0" hangingPunct="1">
+        <a:lnSpc>
+          <a:spcPct val="90000"/>
+        </a:lnSpc>
+        <a:spcBef>
+          <a:spcPct val="0"/>
+        </a:spcBef>
+        <a:buNone/>
+        <a:defRPr sz="4400" kern="1200">
+          <a:solidFill>
+            <a:schemeClr val="tx1"/>
+          </a:solidFill>
+          <a:latin typeface="+mj-lt"/>
+          <a:ea typeface="+mj-ea"/>
+          <a:cs typeface="+mj-cs"/>
+        </a:defRPr>
+      </a:lvl1pPr>
+    </p:titleStyle>
+    <p:bodyStyle>
+      <a:lvl1pPr marL="228600" indent="-228600" algn="l" defTabSz="914400" rtl="0" eaLnBrk="1" latinLnBrk="0" hangingPunct="1">
+        <a:lnSpc>
+          <a:spcPct val="90000"/>
+        </a:lnSpc>
+        <a:spcBef>
+          <a:spcPts val="1000"/>
+        </a:spcBef>
+        <a:buFont typeface="Arial"/>
+        <a:buChar char="•"/>
+        <a:defRPr sz="2800" kern="1200">
+          <a:solidFill>
+            <a:schemeClr val="tx1"/>
+          </a:solidFill>
+          <a:latin typeface="+mn-lt"/>
+          <a:ea typeface="+mn-ea"/>
+          <a:cs typeface="+mn-cs"/>
+        </a:defRPr>
+      </a:lvl1pPr>
+      <a:lvl2pPr marL="685800" indent="-228600" algn="l" defTabSz="914400" rtl="0" eaLnBrk="1" latinLnBrk="0" hangingPunct="1">
+        <a:lnSpc>
+          <a:spcPct val="90000"/>
+        </a:lnSpc>
+        <a:spcBef>
+          <a:spcPts val="500"/>
+        </a:spcBef>
+        <a:buFont typeface="Arial"/>
+        <a:buChar char="•"/>
+        <a:defRPr sz="2400" kern="1200">
+          <a:solidFill>
+            <a:schemeClr val="tx1"/>
+          </a:solidFill>
+          <a:latin typeface="+mn-lt"/>
+          <a:ea typeface="+mn-ea"/>
+          <a:cs typeface="+mn-cs"/>
+        </a:defRPr>
+      </a:lvl2pPr>
+      <a:lvl3pPr marL="1143000" indent="-228600" algn="l" defTabSz="914400" rtl="0" eaLnBrk="1" latinLnBrk="0" hangingPunct="1">
+        <a:lnSpc>
+          <a:spcPct val="90000"/>
+        </a:lnSpc>
+        <a:spcBef>
+          <a:spcPts val="500"/>
+        </a:spcBef>
+        <a:buFont typeface="Arial"/>
+        <a:buChar char="•"/>
+        <a:defRPr sz="2000" kern="1200">
+          <a:solidFill>
+            <a:schemeClr val="tx1"/>
+          </a:solidFill>
+          <a:latin typeface="+mn-lt"/>
+          <a:ea typeface="+mn-ea"/>
+          <a:cs typeface="+mn-cs"/>
+        </a:defRPr>
+      </a:lvl3pPr>
+      <a:lvl4pPr marL="1600200" indent="-228600" algn="l" defTabSz="914400" rtl="0" eaLnBrk="1" latinLnBrk="0" hangingPunct="1">
+        <a:lnSpc>
+          <a:spcPct val="90000"/>
+        </a:lnSpc>
+        <a:spcBef>
+          <a:spcPts val="500"/>
+        </a:spcBef>
+        <a:buFont typeface="Arial"/>
+        <a:buChar char="•"/>
+        <a:defRPr sz="1800" kern="1200">
+          <a:solidFill>
+            <a:schemeClr val="tx1"/>
+          </a:solidFill>
+          <a:latin typeface="+mn-lt"/>
+          <a:ea typeface="+mn-ea"/>
+          <a:cs typeface="+mn-cs"/>
+        </a:defRPr>
+      </a:lvl4pPr>
+      <a:lvl5pPr marL="2057400" indent="-228600" algn="l" defTabSz="914400" rtl="0" eaLnBrk="1" latinLnBrk="0" hangingPunct="1">
+        <a:lnSpc>
+          <a:spcPct val="90000"/>
+        </a:lnSpc>
+        <a:spcBef>
+          <a:spcPts val="500"/>
+        </a:spcBef>
+        <a:buFont typeface="Arial"/>
+        <a:buChar char="•"/>
+        <a:defRPr sz="1800" kern="1200">
+          <a:solidFill>
+            <a:schemeClr val="tx1"/>
+          </a:solidFill>
+          <a:latin typeface="+mn-lt"/>
+          <a:ea typeface="+mn-ea"/>
+          <a:cs typeface="+mn-cs"/>
+        </a:defRPr>
+      </a:lvl5pPr>
+      <a:lvl6pPr marL="2514600" indent="-228600" algn="l" defTabSz="914400" rtl="0" eaLnBrk="1" latinLnBrk="0" hangingPunct="1">
+        <a:lnSpc>
+          <a:spcPct val="90000"/>
+        </a:lnSpc>
+        <a:spcBef>
+          <a:spcPts val="500"/>
+        </a:spcBef>
+        <a:buFont typeface="Arial"/>
+        <a:buChar char="•"/>
+        <a:defRPr sz="1800" kern="1200">
+          <a:solidFill>
+            <a:schemeClr val="tx1"/>
+          </a:solidFill>
+          <a:latin typeface="+mn-lt"/>
+          <a:ea typeface="+mn-ea"/>
+          <a:cs typeface="+mn-cs"/>
+        </a:defRPr>
+      </a:lvl6pPr>
+      <a:lvl7pPr marL="2971800" indent="-228600" algn="l" defTabSz="914400" rtl="0" eaLnBrk="1" latinLnBrk="0" hangingPunct="1">
+        <a:lnSpc>
+          <a:spcPct val="90000"/>
+        </a:lnSpc>
+        <a:spcBef>
+          <a:spcPts val="500"/>
+        </a:spcBef>
+        <a:buFont typeface="Arial"/>
+        <a:buChar char="•"/>
+        <a:defRPr sz="1800" kern="1200">
+          <a:solidFill>
+            <a:schemeClr val="tx1"/>
+          </a:solidFill>
+          <a:latin typeface="+mn-lt"/>
+          <a:ea typeface="+mn-ea"/>
+          <a:cs typeface="+mn-cs"/>
+        </a:defRPr>
+      </a:lvl7pPr>
+      <a:lvl8pPr marL="3429000" indent="-228600" algn="l" defTabSz="914400" rtl="0" eaLnBrk="1" latinLnBrk="0" hangingPunct="1">
+        <a:lnSpc>
+          <a:spcPct val="90000"/>
+        </a:lnSpc>
+        <a:spcBef>
+          <a:spcPts val="500"/>
+        </a:spcBef>
+        <a:buFont typeface="Arial"/>
+        <a:buChar char="•"/>
+        <a:defRPr sz="1800" kern="1200">
+          <a:solidFill>
+            <a:schemeClr val="tx1"/>
+          </a:solidFill>
+          <a:latin typeface="+mn-lt"/>
+          <a:ea typeface="+mn-ea"/>
+          <a:cs typeface="+mn-cs"/>
+        </a:defRPr>
+      </a:lvl8pPr>
+      <a:lvl9pPr marL="3886200" indent="-228600" algn="l" defTabSz="914400" rtl="0" eaLnBrk="1" latinLnBrk="0" hangingPunct="1">
+        <a:lnSpc>
+          <a:spcPct val="90000"/>
+        </a:lnSpc>
+        <a:spcBef>
+          <a:spcPts val="500"/>
+        </a:spcBef>
+        <a:buFont typeface="Arial"/>
+        <a:buChar char="•"/>
+        <a:defRPr sz="1800" kern="1200">
+          <a:solidFill>
+            <a:schemeClr val="tx1"/>
+          </a:solidFill>
+          <a:latin typeface="+mn-lt"/>
+          <a:ea typeface="+mn-ea"/>
+          <a:cs typeface="+mn-cs"/>
+        </a:defRPr>
+      </a:lvl9pPr>
+    </p:bodyStyle>
+    <p:otherStyle>
+      <a:defPPr>
+        <a:defRPr lang="en-US"/>
+      </a:defPPr>
+      <a:lvl1pPr marL="0" algn="l" defTabSz="914400" rtl="0" eaLnBrk="1" latinLnBrk="0" hangingPunct="1">
+        <a:defRPr sz="1800" kern="1200">
+          <a:solidFill>
+            <a:schemeClr val="tx1"/>
+          </a:solidFill>
+          <a:latin typeface="+mn-lt"/>
+          <a:ea typeface="+mn-ea"/>
+          <a:cs typeface="+mn-cs"/>
+        </a:defRPr>
+      </a:lvl1pPr>
+      <a:lvl2pPr marL="457200" algn="l" defTabSz="914400" rtl="0" eaLnBrk="1" latinLnBrk="0" hangingPunct="1">
+        <a:defRPr sz="1800" kern="1200">
+          <a:solidFill>
+            <a:schemeClr val="tx1"/>
+          </a:solidFill>
+          <a:latin typeface="+mn-lt"/>
+          <a:ea typeface="+mn-ea"/>
+          <a:cs typeface="+mn-cs"/>
+        </a:defRPr>
+      </a:lvl2pPr>
+      <a:lvl3pPr marL="914400" algn="l" defTabSz="914400" rtl="0" eaLnBrk="1" latinLnBrk="0" hangingPunct="1">
+        <a:defRPr sz="1800" kern="1200">
+          <a:solidFill>
+            <a:schemeClr val="tx1"/>
+          </a:solidFill>
+          <a:latin typeface="+mn-lt"/>
+          <a:ea typeface="+mn-ea"/>
+          <a:cs typeface="+mn-cs"/>
+        </a:defRPr>
+      </a:lvl3pPr>
+      <a:lvl4pPr marL="1371600" algn="l" defTabSz="914400" rtl="0" eaLnBrk="1" latinLnBrk="0" hangingPunct="1">
+        <a:defRPr sz="1800" kern="1200">
+          <a:solidFill>
+            <a:schemeClr val="tx1"/>
+          </a:solidFill>
+          <a:latin typeface="+mn-lt"/>
+          <a:ea typeface="+mn-ea"/>
+          <a:cs typeface="+mn-cs"/>
+        </a:defRPr>
+      </a:lvl4pPr>
+      <a:lvl5pPr marL="1828800" algn="l" defTabSz="914400" rtl="0" eaLnBrk="1" latinLnBrk="0" hangingPunct="1">
+        <a:defRPr sz="1800" kern="1200">
+          <a:solidFill>
+            <a:schemeClr val="tx1"/>
+          </a:solidFill>
+          <a:latin typeface="+mn-lt"/>
+          <a:ea typeface="+mn-ea"/>
+          <a:cs typeface="+mn-cs"/>
+        </a:defRPr>
+      </a:lvl5pPr>
+      <a:lvl6pPr marL="2286000" algn="l" defTabSz="914400" rtl="0" eaLnBrk="1" latinLnBrk="0" hangingPunct="1">
+        <a:defRPr sz="1800" kern="1200">
+          <a:solidFill>
+            <a:schemeClr val="tx1"/>
+          </a:solidFill>
+          <a:latin typeface="+mn-lt"/>
+          <a:ea typeface="+mn-ea"/>
+          <a:cs typeface="+mn-cs"/>
+        </a:defRPr>
+      </a:lvl6pPr>
+      <a:lvl7pPr marL="2743200" algn="l" defTabSz="914400" rtl="0" eaLnBrk="1" latinLnBrk="0" hangingPunct="1">
+        <a:defRPr sz="1800" kern="1200">
+          <a:solidFill>
+            <a:schemeClr val="tx1"/>
+          </a:solidFill>
+          <a:latin typeface="+mn-lt"/>
+          <a:ea typeface="+mn-ea"/>
+          <a:cs typeface="+mn-cs"/>
+        </a:defRPr>
+      </a:lvl7pPr>
+      <a:lvl8pPr marL="3200400" algn="l" defTabSz="914400" rtl="0" eaLnBrk="1" latinLnBrk="0" hangingPunct="1">
+        <a:defRPr sz="1800" kern="1200">
+          <a:solidFill>
+            <a:schemeClr val="tx1"/>
+          </a:solidFill>
+          <a:latin typeface="+mn-lt"/>
+          <a:ea typeface="+mn-ea"/>
+          <a:cs typeface="+mn-cs"/>
+        </a:defRPr>
+      </a:lvl8pPr>
+      <a:lvl9pPr marL="3657600" algn="l" defTabSz="914400" rtl="0" eaLnBrk="1" latinLnBrk="0" hangingPunct="1">
+        <a:defRPr sz="1800" kern="1200">
+          <a:solidFill>
+            <a:schemeClr val="tx1"/>
+          </a:solidFill>
+          <a:latin typeface="+mn-lt"/>
+          <a:ea typeface="+mn-ea"/>
+          <a:cs typeface="+mn-cs"/>
+        </a:defRPr>
+      </a:lvl9pPr>
+    </p:otherStyle>
+  </p:txStyles>
 </p:sldMaster>
 </file>
 
 <file path=ppt/slides/slide1.xml><?xml version="1.0" encoding="utf-8"?>
-<p:sld xmlns:a="http://schemas.openxmlformats.org/drawingml/2006/main" xmlns:p="http://schemas.openxmlformats.org/presentationml/2006/main" xmlns:r="http://schemas.openxmlformats.org/officeDocument/2006/relationships" xmlns:p14="http://schemas.microsoft.com/office/powerpoint/2010/main" xmlns:p15="http://schemas.microsoft.com/office/powerpoint/2012/main" xmlns:mc="http://schemas.openxmlformats.org/markup-compatibility/2006">
+<p:sld xmlns:a="http://schemas.openxmlformats.org/drawingml/2006/main" xmlns:r="http://schemas.openxmlformats.org/officeDocument/2006/relationships" xmlns:p="http://schemas.openxmlformats.org/presentationml/2006/main">
   <p:cSld>
     <p:spTree>
       <p:nvGrpSpPr>
@@ -2065,8 +2575,8 @@
         </p:nvSpPr>
         <p:spPr>
           <a:xfrm>
-            <a:off x="7156080" y="834840"/>
-            <a:ext cx="31935600" cy="2167560"/>
+            <a:off x="7226418" y="834839"/>
+            <a:ext cx="31935600" cy="4055914"/>
           </a:xfrm>
           <a:prstGeom prst="rect">
             <a:avLst/>
@@ -2077,13 +2587,20 @@
           </a:ln>
         </p:spPr>
         <p:style>
-          <a:lnRef idx="0"/>
-          <a:fillRef idx="0"/>
-          <a:effectRef idx="0"/>
+          <a:lnRef idx="0">
+            <a:scrgbClr r="0" g="0" b="0"/>
+          </a:lnRef>
+          <a:fillRef idx="0">
+            <a:scrgbClr r="0" g="0" b="0"/>
+          </a:fillRef>
+          <a:effectRef idx="0">
+            <a:scrgbClr r="0" g="0" b="0"/>
+          </a:effectRef>
           <a:fontRef idx="minor"/>
         </p:style>
         <p:txBody>
-          <a:bodyPr lIns="94680" rIns="94680" tIns="47520" bIns="47520"/>
+          <a:bodyPr lIns="94680" tIns="47520" rIns="94680" bIns="47520"/>
+          <a:lstStyle/>
           <a:p>
             <a:pPr algn="ctr">
               <a:lnSpc>
@@ -2091,30 +2608,174 @@
               </a:lnSpc>
             </a:pPr>
             <a:r>
-              <a:rPr b="1" lang="en-US" sz="6800" spc="-1" strike="noStrike">
-                <a:solidFill>
-                  <a:srgbClr val="2f2b20"/>
+              <a:rPr lang="en-US" sz="8800" b="1" strike="noStrike" spc="-1" dirty="0">
+                <a:solidFill>
+                  <a:srgbClr val="2F2B20"/>
                 </a:solidFill>
                 <a:uFill>
                   <a:solidFill>
-                    <a:srgbClr val="ffffff"/>
+                    <a:srgbClr val="FFFFFF"/>
+                  </a:solidFill>
+                </a:uFill>
+                <a:latin typeface="Arial Rounded MT Bold" charset="0"/>
+                <a:ea typeface="Arial Rounded MT Bold" charset="0"/>
+                <a:cs typeface="Arial Rounded MT Bold" charset="0"/>
+              </a:rPr>
+              <a:t>Tic-Tac-Toe </a:t>
+            </a:r>
+            <a:r>
+              <a:rPr lang="en-US" sz="8800" b="1" spc="-1" dirty="0" smtClean="0">
+                <a:solidFill>
+                  <a:srgbClr val="2F2B20"/>
+                </a:solidFill>
+                <a:uFill>
+                  <a:solidFill>
+                    <a:srgbClr val="FFFFFF"/>
+                  </a:solidFill>
+                </a:uFill>
+                <a:latin typeface="Arial Rounded MT Bold" charset="0"/>
+                <a:ea typeface="Arial Rounded MT Bold" charset="0"/>
+                <a:cs typeface="Arial Rounded MT Bold" charset="0"/>
+              </a:rPr>
+              <a:t>&amp; the </a:t>
+            </a:r>
+            <a:r>
+              <a:rPr lang="en-US" sz="8800" b="1" strike="noStrike" spc="-1" dirty="0" smtClean="0">
+                <a:solidFill>
+                  <a:srgbClr val="2F2B20"/>
+                </a:solidFill>
+                <a:uFill>
+                  <a:solidFill>
+                    <a:srgbClr val="FFFFFF"/>
+                  </a:solidFill>
+                </a:uFill>
+                <a:latin typeface="Arial Rounded MT Bold" charset="0"/>
+                <a:ea typeface="Arial Rounded MT Bold" charset="0"/>
+                <a:cs typeface="Arial Rounded MT Bold" charset="0"/>
+              </a:rPr>
+              <a:t>Transmission Control Protocol </a:t>
+            </a:r>
+            <a:endParaRPr lang="en-US" sz="8800" b="1" strike="noStrike" spc="-1" dirty="0">
+              <a:solidFill>
+                <a:srgbClr val="000000"/>
+              </a:solidFill>
+              <a:uFill>
+                <a:solidFill>
+                  <a:srgbClr val="FFFFFF"/>
+                </a:solidFill>
+              </a:uFill>
+              <a:latin typeface="Arial Rounded MT Bold" charset="0"/>
+              <a:ea typeface="Arial Rounded MT Bold" charset="0"/>
+              <a:cs typeface="Arial Rounded MT Bold" charset="0"/>
+            </a:endParaRPr>
+          </a:p>
+          <a:p>
+            <a:pPr algn="ctr">
+              <a:lnSpc>
+                <a:spcPct val="100000"/>
+              </a:lnSpc>
+            </a:pPr>
+            <a:r>
+              <a:rPr lang="en-US" sz="7200" b="0" strike="noStrike" spc="-1" dirty="0" smtClean="0">
+                <a:solidFill>
+                  <a:srgbClr val="2F2B20"/>
+                </a:solidFill>
+                <a:uFill>
+                  <a:solidFill>
+                    <a:srgbClr val="FFFFFF"/>
                   </a:solidFill>
                 </a:uFill>
                 <a:latin typeface="Arial"/>
                 <a:ea typeface="MS PGothic"/>
               </a:rPr>
-              <a:t>Tic-Tac-Toe TCP</a:t>
-            </a:r>
-            <a:endParaRPr b="0" lang="en-US" sz="1800" spc="-1" strike="noStrike">
-              <a:solidFill>
-                <a:srgbClr val="000000"/>
-              </a:solidFill>
-              <a:uFill>
-                <a:solidFill>
-                  <a:srgbClr val="ffffff"/>
+              <a:t>Fujii </a:t>
+            </a:r>
+            <a:r>
+              <a:rPr lang="en-US" sz="7200" b="0" strike="noStrike" spc="-1" dirty="0">
+                <a:solidFill>
+                  <a:srgbClr val="2F2B20"/>
+                </a:solidFill>
+                <a:uFill>
+                  <a:solidFill>
+                    <a:srgbClr val="FFFFFF"/>
+                  </a:solidFill>
+                </a:uFill>
+                <a:latin typeface="Arial"/>
+                <a:ea typeface="MS PGothic"/>
+              </a:rPr>
+              <a:t>Maika, </a:t>
+            </a:r>
+            <a:r>
+              <a:rPr lang="en-US" sz="7200" b="0" strike="noStrike" spc="-1" dirty="0" smtClean="0">
+                <a:solidFill>
+                  <a:srgbClr val="2F2B20"/>
+                </a:solidFill>
+                <a:uFill>
+                  <a:solidFill>
+                    <a:srgbClr val="FFFFFF"/>
+                  </a:solidFill>
+                </a:uFill>
+                <a:latin typeface="Arial"/>
+                <a:ea typeface="MS PGothic"/>
+              </a:rPr>
+              <a:t>Madden </a:t>
+            </a:r>
+            <a:r>
+              <a:rPr lang="en-US" sz="7200" b="0" strike="noStrike" spc="-1" dirty="0">
+                <a:solidFill>
+                  <a:srgbClr val="2F2B20"/>
+                </a:solidFill>
+                <a:uFill>
+                  <a:solidFill>
+                    <a:srgbClr val="FFFFFF"/>
+                  </a:solidFill>
+                </a:uFill>
+                <a:latin typeface="Arial"/>
+                <a:ea typeface="MS PGothic"/>
+              </a:rPr>
+              <a:t>Tommy, </a:t>
+            </a:r>
+            <a:r>
+              <a:rPr lang="en-US" sz="7200" b="0" strike="noStrike" spc="-1" dirty="0" err="1" smtClean="0">
+                <a:solidFill>
+                  <a:srgbClr val="2F2B20"/>
+                </a:solidFill>
+                <a:uFill>
+                  <a:solidFill>
+                    <a:srgbClr val="FFFFFF"/>
+                  </a:solidFill>
+                </a:uFill>
+                <a:latin typeface="Arial"/>
+                <a:ea typeface="MS PGothic"/>
+              </a:rPr>
+              <a:t>Tidgewell</a:t>
+            </a:r>
+            <a:r>
+              <a:rPr lang="en-US" sz="7200" b="0" strike="noStrike" spc="-1" dirty="0" smtClean="0">
+                <a:solidFill>
+                  <a:srgbClr val="2F2B20"/>
+                </a:solidFill>
+                <a:uFill>
+                  <a:solidFill>
+                    <a:srgbClr val="FFFFFF"/>
+                  </a:solidFill>
+                </a:uFill>
+                <a:latin typeface="Arial"/>
+                <a:ea typeface="MS PGothic"/>
+              </a:rPr>
+              <a:t> Dillon</a:t>
+            </a:r>
+            <a:endParaRPr lang="en-US" sz="7200" spc="-1" dirty="0">
+              <a:solidFill>
+                <a:srgbClr val="2F2B20"/>
+              </a:solidFill>
+              <a:uFill>
+                <a:solidFill>
+                  <a:srgbClr val="FFFFFF"/>
                 </a:solidFill>
               </a:uFill>
               <a:latin typeface="Arial"/>
+              <a:ea typeface="MS PGothic"/>
             </a:endParaRPr>
           </a:p>
           <a:p>
@@ -2124,27 +2785,24 @@
               </a:lnSpc>
             </a:pPr>
             <a:r>
-              <a:rPr b="0" lang="en-US" sz="6800" spc="-1" strike="noStrike">
-                <a:solidFill>
-                  <a:srgbClr val="2f2b20"/>
-                </a:solidFill>
-                <a:uFill>
-                  <a:solidFill>
-                    <a:srgbClr val="ffffff"/>
-                  </a:solidFill>
-                </a:uFill>
-                <a:latin typeface="Arial"/>
-                <a:ea typeface="MS PGothic"/>
-              </a:rPr>
-              <a:t>Fujii, Maika, Madden, Tommy, Tidgewell Dillon</a:t>
-            </a:r>
-            <a:endParaRPr b="0" lang="en-US" sz="1800" spc="-1" strike="noStrike">
+              <a:rPr lang="en-US" sz="5400" dirty="0" err="1"/>
+              <a:t>Schmid</a:t>
+            </a:r>
+            <a:r>
+              <a:rPr lang="en-US" sz="5400" dirty="0"/>
+              <a:t> College of Science and </a:t>
+            </a:r>
+            <a:r>
+              <a:rPr lang="en-US" sz="5400" dirty="0" smtClean="0"/>
+              <a:t>Technology, Chapman University, Orange, CA 92868</a:t>
+            </a:r>
+            <a:endParaRPr lang="en-US" sz="5400" b="0" strike="noStrike" spc="-1" dirty="0">
               <a:solidFill>
                 <a:srgbClr val="000000"/>
               </a:solidFill>
               <a:uFill>
                 <a:solidFill>
-                  <a:srgbClr val="ffffff"/>
+                  <a:srgbClr val="FFFFFF"/>
                 </a:solidFill>
               </a:uFill>
               <a:latin typeface="Arial"/>
@@ -2177,9 +2835,15 @@
           </a:ln>
         </p:spPr>
         <p:style>
-          <a:lnRef idx="0"/>
-          <a:fillRef idx="0"/>
-          <a:effectRef idx="0"/>
+          <a:lnRef idx="0">
+            <a:scrgbClr r="0" g="0" b="0"/>
+          </a:lnRef>
+          <a:fillRef idx="0">
+            <a:scrgbClr r="0" g="0" b="0"/>
+          </a:fillRef>
+          <a:effectRef idx="0">
+            <a:scrgbClr r="0" g="0" b="0"/>
+          </a:effectRef>
           <a:fontRef idx="minor"/>
         </p:style>
       </p:sp>
@@ -2203,13 +2867,20 @@
           </a:ln>
         </p:spPr>
         <p:style>
-          <a:lnRef idx="0"/>
-          <a:fillRef idx="0"/>
-          <a:effectRef idx="0"/>
+          <a:lnRef idx="0">
+            <a:scrgbClr r="0" g="0" b="0"/>
+          </a:lnRef>
+          <a:fillRef idx="0">
+            <a:scrgbClr r="0" g="0" b="0"/>
+          </a:fillRef>
+          <a:effectRef idx="0">
+            <a:scrgbClr r="0" g="0" b="0"/>
+          </a:effectRef>
           <a:fontRef idx="minor"/>
         </p:style>
         <p:txBody>
-          <a:bodyPr wrap="none" lIns="94680" rIns="94680" tIns="47520" bIns="47520"/>
+          <a:bodyPr wrap="none" lIns="94680" tIns="47520" rIns="94680" bIns="47520"/>
+          <a:lstStyle/>
           <a:p>
             <a:pPr>
               <a:lnSpc>
@@ -2217,13 +2888,13 @@
               </a:lnSpc>
             </a:pPr>
             <a:r>
-              <a:rPr b="0" lang="en-US" sz="3700" spc="-1" strike="noStrike">
-                <a:solidFill>
-                  <a:srgbClr val="ffffff"/>
+              <a:rPr lang="en-US" sz="3700" b="0" strike="noStrike" spc="-1">
+                <a:solidFill>
+                  <a:srgbClr val="FFFFFF"/>
                 </a:solidFill>
                 <a:uFill>
                   <a:solidFill>
-                    <a:srgbClr val="ffffff"/>
+                    <a:srgbClr val="FFFFFF"/>
                   </a:solidFill>
                 </a:uFill>
                 <a:latin typeface="Arial"/>
@@ -2231,13 +2902,13 @@
               </a:rPr>
               <a:t>a</a:t>
             </a:r>
-            <a:endParaRPr b="0" lang="en-US" sz="1800" spc="-1" strike="noStrike">
+            <a:endParaRPr lang="en-US" sz="1800" b="0" strike="noStrike" spc="-1">
               <a:solidFill>
                 <a:srgbClr val="000000"/>
               </a:solidFill>
               <a:uFill>
                 <a:solidFill>
-                  <a:srgbClr val="ffffff"/>
+                  <a:srgbClr val="FFFFFF"/>
                 </a:solidFill>
               </a:uFill>
               <a:latin typeface="Arial"/>
@@ -2265,13 +2936,20 @@
           </a:ln>
         </p:spPr>
         <p:style>
-          <a:lnRef idx="0"/>
-          <a:fillRef idx="0"/>
-          <a:effectRef idx="0"/>
+          <a:lnRef idx="0">
+            <a:scrgbClr r="0" g="0" b="0"/>
+          </a:lnRef>
+          <a:fillRef idx="0">
+            <a:scrgbClr r="0" g="0" b="0"/>
+          </a:fillRef>
+          <a:effectRef idx="0">
+            <a:scrgbClr r="0" g="0" b="0"/>
+          </a:effectRef>
           <a:fontRef idx="minor"/>
         </p:style>
         <p:txBody>
-          <a:bodyPr wrap="none" lIns="94680" rIns="94680" tIns="47520" bIns="47520"/>
+          <a:bodyPr wrap="none" lIns="94680" tIns="47520" rIns="94680" bIns="47520"/>
+          <a:lstStyle/>
           <a:p>
             <a:pPr>
               <a:lnSpc>
@@ -2279,13 +2957,13 @@
               </a:lnSpc>
             </a:pPr>
             <a:r>
-              <a:rPr b="0" lang="en-US" sz="3700" spc="-1" strike="noStrike">
-                <a:solidFill>
-                  <a:srgbClr val="ffffff"/>
+              <a:rPr lang="en-US" sz="3700" b="0" strike="noStrike" spc="-1">
+                <a:solidFill>
+                  <a:srgbClr val="FFFFFF"/>
                 </a:solidFill>
                 <a:uFill>
                   <a:solidFill>
-                    <a:srgbClr val="ffffff"/>
+                    <a:srgbClr val="FFFFFF"/>
                   </a:solidFill>
                 </a:uFill>
                 <a:latin typeface="Arial"/>
@@ -2293,13 +2971,13 @@
               </a:rPr>
               <a:t>b</a:t>
             </a:r>
-            <a:endParaRPr b="0" lang="en-US" sz="1800" spc="-1" strike="noStrike">
+            <a:endParaRPr lang="en-US" sz="1800" b="0" strike="noStrike" spc="-1">
               <a:solidFill>
                 <a:srgbClr val="000000"/>
               </a:solidFill>
               <a:uFill>
                 <a:solidFill>
-                  <a:srgbClr val="ffffff"/>
+                  <a:srgbClr val="FFFFFF"/>
                 </a:solidFill>
               </a:uFill>
               <a:latin typeface="Arial"/>
@@ -2309,12 +2987,12 @@
       </p:sp>
       <p:pic>
         <p:nvPicPr>
-          <p:cNvPr id="46" name="Picture 2" descr=""/>
+          <p:cNvPr id="46" name="Picture 2"/>
           <p:cNvPicPr/>
           <p:nvPr/>
         </p:nvPicPr>
         <p:blipFill>
-          <a:blip r:embed="rId1"/>
+          <a:blip r:embed="rId3"/>
           <a:stretch/>
         </p:blipFill>
         <p:spPr>
@@ -2338,8 +3016,8 @@
         </p:nvSpPr>
         <p:spPr>
           <a:xfrm>
-            <a:off x="1294920" y="7725600"/>
-            <a:ext cx="11886840" cy="7128000"/>
+            <a:off x="833005" y="7359494"/>
+            <a:ext cx="12266494" cy="3840682"/>
           </a:xfrm>
           <a:prstGeom prst="rect">
             <a:avLst/>
@@ -2352,13 +3030,20 @@
           </a:ln>
         </p:spPr>
         <p:style>
-          <a:lnRef idx="0"/>
-          <a:fillRef idx="0"/>
-          <a:effectRef idx="0"/>
+          <a:lnRef idx="0">
+            <a:scrgbClr r="0" g="0" b="0"/>
+          </a:lnRef>
+          <a:fillRef idx="0">
+            <a:scrgbClr r="0" g="0" b="0"/>
+          </a:fillRef>
+          <a:effectRef idx="0">
+            <a:scrgbClr r="0" g="0" b="0"/>
+          </a:effectRef>
           <a:fontRef idx="minor"/>
         </p:style>
         <p:txBody>
-          <a:bodyPr lIns="90000" rIns="90000" tIns="45000" bIns="45000"/>
+          <a:bodyPr lIns="90000" tIns="45000" rIns="90000" bIns="45000"/>
+          <a:lstStyle/>
           <a:p>
             <a:pPr>
               <a:lnSpc>
@@ -2366,27 +3051,57 @@
               </a:lnSpc>
             </a:pPr>
             <a:r>
-              <a:rPr b="0" lang="en-US" sz="6600" spc="-1" strike="noStrike">
-                <a:solidFill>
-                  <a:srgbClr val="2f2b20"/>
+              <a:rPr lang="en-US" sz="4800" b="0" strike="noStrike" spc="-1" dirty="0">
+                <a:solidFill>
+                  <a:srgbClr val="2F2B20"/>
                 </a:solidFill>
                 <a:uFill>
                   <a:solidFill>
-                    <a:srgbClr val="ffffff"/>
+                    <a:srgbClr val="FFFFFF"/>
                   </a:solidFill>
                 </a:uFill>
                 <a:latin typeface="Arial"/>
                 <a:ea typeface="MS PGothic"/>
               </a:rPr>
-              <a:t>The aim of this project was to investigate the aspects of Transimission Control Protocol in a practical way by making a Tic Tac Toe game which matched up players randomly via a universal server.</a:t>
-            </a:r>
-            <a:endParaRPr b="0" lang="en-US" sz="1800" spc="-1" strike="noStrike">
+              <a:t>The aim of this project was to investigate the aspects of </a:t>
+            </a:r>
+            <a:r>
+              <a:rPr lang="en-US" sz="4800" b="0" strike="noStrike" spc="-1" dirty="0" smtClean="0">
+                <a:solidFill>
+                  <a:srgbClr val="2F2B20"/>
+                </a:solidFill>
+                <a:uFill>
+                  <a:solidFill>
+                    <a:srgbClr val="FFFFFF"/>
+                  </a:solidFill>
+                </a:uFill>
+                <a:latin typeface="Arial"/>
+                <a:ea typeface="MS PGothic"/>
+              </a:rPr>
+              <a:t>Transmission </a:t>
+            </a:r>
+            <a:r>
+              <a:rPr lang="en-US" sz="4800" b="0" strike="noStrike" spc="-1" dirty="0">
+                <a:solidFill>
+                  <a:srgbClr val="2F2B20"/>
+                </a:solidFill>
+                <a:uFill>
+                  <a:solidFill>
+                    <a:srgbClr val="FFFFFF"/>
+                  </a:solidFill>
+                </a:uFill>
+                <a:latin typeface="Arial"/>
+                <a:ea typeface="MS PGothic"/>
+              </a:rPr>
+              <a:t>Control Protocol in a practical way by making a Tic Tac Toe game which matched up players randomly via a universal server.</a:t>
+            </a:r>
+            <a:endParaRPr lang="en-US" sz="4800" b="0" strike="noStrike" spc="-1" dirty="0">
               <a:solidFill>
                 <a:srgbClr val="000000"/>
               </a:solidFill>
               <a:uFill>
                 <a:solidFill>
-                  <a:srgbClr val="ffffff"/>
+                  <a:srgbClr val="FFFFFF"/>
                 </a:solidFill>
               </a:uFill>
               <a:latin typeface="Arial"/>
@@ -2402,7 +3117,7 @@
         </p:nvSpPr>
         <p:spPr>
           <a:xfrm>
-            <a:off x="5065200" y="6802560"/>
+            <a:off x="5064479" y="6229723"/>
             <a:ext cx="4183200" cy="914760"/>
           </a:xfrm>
           <a:prstGeom prst="rect">
@@ -2414,13 +3129,20 @@
           </a:ln>
         </p:spPr>
         <p:style>
-          <a:lnRef idx="0"/>
-          <a:fillRef idx="0"/>
-          <a:effectRef idx="0"/>
+          <a:lnRef idx="0">
+            <a:scrgbClr r="0" g="0" b="0"/>
+          </a:lnRef>
+          <a:fillRef idx="0">
+            <a:scrgbClr r="0" g="0" b="0"/>
+          </a:fillRef>
+          <a:effectRef idx="0">
+            <a:scrgbClr r="0" g="0" b="0"/>
+          </a:effectRef>
           <a:fontRef idx="minor"/>
         </p:style>
         <p:txBody>
           <a:bodyPr wrap="none"/>
+          <a:lstStyle/>
           <a:p>
             <a:pPr algn="ctr">
               <a:lnSpc>
@@ -2428,13 +3150,13 @@
               </a:lnSpc>
             </a:pPr>
             <a:r>
-              <a:rPr b="1" lang="en-US" sz="5400" spc="-1" strike="noStrike">
-                <a:solidFill>
-                  <a:srgbClr val="2f2b20"/>
+              <a:rPr lang="en-US" sz="5400" b="1" strike="noStrike" spc="-1" dirty="0">
+                <a:solidFill>
+                  <a:srgbClr val="2F2B20"/>
                 </a:solidFill>
                 <a:uFill>
                   <a:solidFill>
-                    <a:srgbClr val="ffffff"/>
+                    <a:srgbClr val="FFFFFF"/>
                   </a:solidFill>
                 </a:uFill>
                 <a:latin typeface="Arial"/>
@@ -2442,13 +3164,13 @@
               </a:rPr>
               <a:t>Introduction</a:t>
             </a:r>
-            <a:endParaRPr b="0" lang="en-US" sz="1800" spc="-1" strike="noStrike">
+            <a:endParaRPr lang="en-US" sz="1800" b="0" strike="noStrike" spc="-1" dirty="0">
               <a:solidFill>
                 <a:srgbClr val="000000"/>
               </a:solidFill>
               <a:uFill>
                 <a:solidFill>
-                  <a:srgbClr val="ffffff"/>
+                  <a:srgbClr val="FFFFFF"/>
                 </a:solidFill>
               </a:uFill>
               <a:latin typeface="Arial"/>
@@ -2464,8 +3186,8 @@
         </p:nvSpPr>
         <p:spPr>
           <a:xfrm>
-            <a:off x="15087600" y="6949440"/>
-            <a:ext cx="14081760" cy="9692640"/>
+            <a:off x="14583025" y="7355491"/>
+            <a:ext cx="14081760" cy="24669712"/>
           </a:xfrm>
           <a:prstGeom prst="rect">
             <a:avLst/>
@@ -2478,9 +3200,15 @@
           </a:ln>
         </p:spPr>
         <p:style>
-          <a:lnRef idx="0"/>
-          <a:fillRef idx="0"/>
-          <a:effectRef idx="0"/>
+          <a:lnRef idx="0">
+            <a:scrgbClr r="0" g="0" b="0"/>
+          </a:lnRef>
+          <a:fillRef idx="0">
+            <a:scrgbClr r="0" g="0" b="0"/>
+          </a:fillRef>
+          <a:effectRef idx="0">
+            <a:scrgbClr r="0" g="0" b="0"/>
+          </a:effectRef>
           <a:fontRef idx="minor"/>
         </p:style>
       </p:sp>
@@ -2492,7 +3220,7 @@
         </p:nvSpPr>
         <p:spPr>
           <a:xfrm>
-            <a:off x="26676360" y="4572000"/>
+            <a:off x="14193145" y="6226226"/>
             <a:ext cx="14471640" cy="914760"/>
           </a:xfrm>
           <a:prstGeom prst="rect">
@@ -2504,13 +3232,20 @@
           </a:ln>
         </p:spPr>
         <p:style>
-          <a:lnRef idx="0"/>
-          <a:fillRef idx="0"/>
-          <a:effectRef idx="0"/>
+          <a:lnRef idx="0">
+            <a:scrgbClr r="0" g="0" b="0"/>
+          </a:lnRef>
+          <a:fillRef idx="0">
+            <a:scrgbClr r="0" g="0" b="0"/>
+          </a:fillRef>
+          <a:effectRef idx="0">
+            <a:scrgbClr r="0" g="0" b="0"/>
+          </a:effectRef>
           <a:fontRef idx="minor"/>
         </p:style>
         <p:txBody>
           <a:bodyPr wrap="none"/>
+          <a:lstStyle/>
           <a:p>
             <a:pPr algn="ctr">
               <a:lnSpc>
@@ -2518,27 +3253,57 @@
               </a:lnSpc>
             </a:pPr>
             <a:r>
-              <a:rPr b="1" lang="en-US" sz="5400" spc="-1" strike="noStrike">
-                <a:solidFill>
-                  <a:srgbClr val="2f2b20"/>
+              <a:rPr lang="en-US" sz="5400" b="1" strike="noStrike" spc="-1" dirty="0" smtClean="0">
+                <a:solidFill>
+                  <a:srgbClr val="2F2B20"/>
                 </a:solidFill>
                 <a:uFill>
                   <a:solidFill>
-                    <a:srgbClr val="ffffff"/>
+                    <a:srgbClr val="FFFFFF"/>
                   </a:solidFill>
                 </a:uFill>
                 <a:latin typeface="Arial"/>
                 <a:ea typeface="MS PGothic"/>
               </a:rPr>
-              <a:t>What is the Transmission Control Protocol?</a:t>
-            </a:r>
-            <a:endParaRPr b="0" lang="en-US" sz="1800" spc="-1" strike="noStrike">
+              <a:t>The Transmission </a:t>
+            </a:r>
+            <a:r>
+              <a:rPr lang="en-US" sz="5400" b="1" strike="noStrike" spc="-1" dirty="0">
+                <a:solidFill>
+                  <a:srgbClr val="2F2B20"/>
+                </a:solidFill>
+                <a:uFill>
+                  <a:solidFill>
+                    <a:srgbClr val="FFFFFF"/>
+                  </a:solidFill>
+                </a:uFill>
+                <a:latin typeface="Arial"/>
+                <a:ea typeface="MS PGothic"/>
+              </a:rPr>
+              <a:t>Control </a:t>
+            </a:r>
+            <a:r>
+              <a:rPr lang="en-US" sz="5400" b="1" strike="noStrike" spc="-1" dirty="0" smtClean="0">
+                <a:solidFill>
+                  <a:srgbClr val="2F2B20"/>
+                </a:solidFill>
+                <a:uFill>
+                  <a:solidFill>
+                    <a:srgbClr val="FFFFFF"/>
+                  </a:solidFill>
+                </a:uFill>
+                <a:latin typeface="Arial"/>
+                <a:ea typeface="MS PGothic"/>
+              </a:rPr>
+              <a:t>Protocol</a:t>
+            </a:r>
+            <a:endParaRPr lang="en-US" sz="1800" b="0" strike="noStrike" spc="-1" dirty="0">
               <a:solidFill>
                 <a:srgbClr val="000000"/>
               </a:solidFill>
               <a:uFill>
                 <a:solidFill>
-                  <a:srgbClr val="ffffff"/>
+                  <a:srgbClr val="FFFFFF"/>
                 </a:solidFill>
               </a:uFill>
               <a:latin typeface="Arial"/>
@@ -2554,8 +3319,8 @@
         </p:nvSpPr>
         <p:spPr>
           <a:xfrm>
-            <a:off x="1188720" y="25727400"/>
-            <a:ext cx="41483160" cy="6185160"/>
+            <a:off x="30148311" y="15574387"/>
+            <a:ext cx="12523570" cy="10100469"/>
           </a:xfrm>
           <a:prstGeom prst="rect">
             <a:avLst/>
@@ -2568,13 +3333,20 @@
           </a:ln>
         </p:spPr>
         <p:style>
-          <a:lnRef idx="0"/>
-          <a:fillRef idx="0"/>
-          <a:effectRef idx="0"/>
+          <a:lnRef idx="0">
+            <a:scrgbClr r="0" g="0" b="0"/>
+          </a:lnRef>
+          <a:fillRef idx="0">
+            <a:scrgbClr r="0" g="0" b="0"/>
+          </a:fillRef>
+          <a:effectRef idx="0">
+            <a:scrgbClr r="0" g="0" b="0"/>
+          </a:effectRef>
           <a:fontRef idx="minor"/>
         </p:style>
         <p:txBody>
-          <a:bodyPr lIns="90000" rIns="90000" tIns="45000" bIns="45000"/>
+          <a:bodyPr lIns="90000" tIns="45000" rIns="90000" bIns="45000"/>
+          <a:lstStyle/>
           <a:p>
             <a:pPr>
               <a:lnSpc>
@@ -2582,27 +3354,147 @@
               </a:lnSpc>
             </a:pPr>
             <a:r>
-              <a:rPr b="0" lang="en-US" sz="8000" spc="-1" strike="noStrike">
-                <a:solidFill>
-                  <a:srgbClr val="2f2b20"/>
+              <a:rPr lang="en-US" sz="5400" b="0" strike="noStrike" spc="-1" dirty="0">
+                <a:solidFill>
+                  <a:srgbClr val="2F2B20"/>
                 </a:solidFill>
                 <a:uFill>
                   <a:solidFill>
-                    <a:srgbClr val="ffffff"/>
+                    <a:srgbClr val="FFFFFF"/>
                   </a:solidFill>
                 </a:uFill>
                 <a:latin typeface="Arial"/>
                 <a:ea typeface="MS PGothic"/>
               </a:rPr>
-              <a:t>First the GameServer must be running to ensure that there is a medium for the clients to communicate. Then, when a specified number of GameClients connect to that GameServer, the players are matched up randomly with other players who are connected to the server. Then, the GUI appears for each client, with a button saying, “Play”. When this is pressed, the TicTacToe game comes up, and the players take turns picking spaces on the board.</a:t>
-            </a:r>
-            <a:endParaRPr b="0" lang="en-US" sz="1800" spc="-1" strike="noStrike">
+              <a:t>First the </a:t>
+            </a:r>
+            <a:r>
+              <a:rPr lang="en-US" sz="5400" b="0" strike="noStrike" spc="-1" dirty="0" err="1">
+                <a:solidFill>
+                  <a:srgbClr val="2F2B20"/>
+                </a:solidFill>
+                <a:uFill>
+                  <a:solidFill>
+                    <a:srgbClr val="FFFFFF"/>
+                  </a:solidFill>
+                </a:uFill>
+                <a:latin typeface="Arial"/>
+                <a:ea typeface="MS PGothic"/>
+              </a:rPr>
+              <a:t>GameServer</a:t>
+            </a:r>
+            <a:r>
+              <a:rPr lang="en-US" sz="5400" b="0" strike="noStrike" spc="-1" dirty="0">
+                <a:solidFill>
+                  <a:srgbClr val="2F2B20"/>
+                </a:solidFill>
+                <a:uFill>
+                  <a:solidFill>
+                    <a:srgbClr val="FFFFFF"/>
+                  </a:solidFill>
+                </a:uFill>
+                <a:latin typeface="Arial"/>
+                <a:ea typeface="MS PGothic"/>
+              </a:rPr>
+              <a:t> must be running to ensure that there is a medium for the clients to communicate. Then, when a specified number of </a:t>
+            </a:r>
+            <a:r>
+              <a:rPr lang="en-US" sz="5400" b="0" strike="noStrike" spc="-1" dirty="0" err="1">
+                <a:solidFill>
+                  <a:srgbClr val="2F2B20"/>
+                </a:solidFill>
+                <a:uFill>
+                  <a:solidFill>
+                    <a:srgbClr val="FFFFFF"/>
+                  </a:solidFill>
+                </a:uFill>
+                <a:latin typeface="Arial"/>
+                <a:ea typeface="MS PGothic"/>
+              </a:rPr>
+              <a:t>GameClients</a:t>
+            </a:r>
+            <a:r>
+              <a:rPr lang="en-US" sz="5400" b="0" strike="noStrike" spc="-1" dirty="0">
+                <a:solidFill>
+                  <a:srgbClr val="2F2B20"/>
+                </a:solidFill>
+                <a:uFill>
+                  <a:solidFill>
+                    <a:srgbClr val="FFFFFF"/>
+                  </a:solidFill>
+                </a:uFill>
+                <a:latin typeface="Arial"/>
+                <a:ea typeface="MS PGothic"/>
+              </a:rPr>
+              <a:t> connect to that </a:t>
+            </a:r>
+            <a:r>
+              <a:rPr lang="en-US" sz="5400" b="0" strike="noStrike" spc="-1" dirty="0" err="1">
+                <a:solidFill>
+                  <a:srgbClr val="2F2B20"/>
+                </a:solidFill>
+                <a:uFill>
+                  <a:solidFill>
+                    <a:srgbClr val="FFFFFF"/>
+                  </a:solidFill>
+                </a:uFill>
+                <a:latin typeface="Arial"/>
+                <a:ea typeface="MS PGothic"/>
+              </a:rPr>
+              <a:t>GameServer</a:t>
+            </a:r>
+            <a:r>
+              <a:rPr lang="en-US" sz="5400" b="0" strike="noStrike" spc="-1" dirty="0">
+                <a:solidFill>
+                  <a:srgbClr val="2F2B20"/>
+                </a:solidFill>
+                <a:uFill>
+                  <a:solidFill>
+                    <a:srgbClr val="FFFFFF"/>
+                  </a:solidFill>
+                </a:uFill>
+                <a:latin typeface="Arial"/>
+                <a:ea typeface="MS PGothic"/>
+              </a:rPr>
+              <a:t>, the players are matched up randomly with other players who are connected to the server. Then, the GUI appears for each client, with a button saying, “Play”. When this is pressed, the </a:t>
+            </a:r>
+            <a:r>
+              <a:rPr lang="en-US" sz="5400" b="0" strike="noStrike" spc="-1" dirty="0" err="1">
+                <a:solidFill>
+                  <a:srgbClr val="2F2B20"/>
+                </a:solidFill>
+                <a:uFill>
+                  <a:solidFill>
+                    <a:srgbClr val="FFFFFF"/>
+                  </a:solidFill>
+                </a:uFill>
+                <a:latin typeface="Arial"/>
+                <a:ea typeface="MS PGothic"/>
+              </a:rPr>
+              <a:t>TicTacToe</a:t>
+            </a:r>
+            <a:r>
+              <a:rPr lang="en-US" sz="5400" b="0" strike="noStrike" spc="-1" dirty="0">
+                <a:solidFill>
+                  <a:srgbClr val="2F2B20"/>
+                </a:solidFill>
+                <a:uFill>
+                  <a:solidFill>
+                    <a:srgbClr val="FFFFFF"/>
+                  </a:solidFill>
+                </a:uFill>
+                <a:latin typeface="Arial"/>
+                <a:ea typeface="MS PGothic"/>
+              </a:rPr>
+              <a:t> game comes up, and the players take turns picking spaces on the board.</a:t>
+            </a:r>
+            <a:endParaRPr lang="en-US" sz="5400" b="0" strike="noStrike" spc="-1" dirty="0">
               <a:solidFill>
                 <a:srgbClr val="000000"/>
               </a:solidFill>
               <a:uFill>
                 <a:solidFill>
-                  <a:srgbClr val="ffffff"/>
+                  <a:srgbClr val="FFFFFF"/>
                 </a:solidFill>
               </a:uFill>
               <a:latin typeface="Arial"/>
@@ -2618,7 +3510,7 @@
         </p:nvSpPr>
         <p:spPr>
           <a:xfrm>
-            <a:off x="19247040" y="24323400"/>
+            <a:off x="34056651" y="14449270"/>
             <a:ext cx="4070160" cy="914760"/>
           </a:xfrm>
           <a:prstGeom prst="rect">
@@ -2630,13 +3522,20 @@
           </a:ln>
         </p:spPr>
         <p:style>
-          <a:lnRef idx="0"/>
-          <a:fillRef idx="0"/>
-          <a:effectRef idx="0"/>
+          <a:lnRef idx="0">
+            <a:scrgbClr r="0" g="0" b="0"/>
+          </a:lnRef>
+          <a:fillRef idx="0">
+            <a:scrgbClr r="0" g="0" b="0"/>
+          </a:fillRef>
+          <a:effectRef idx="0">
+            <a:scrgbClr r="0" g="0" b="0"/>
+          </a:effectRef>
           <a:fontRef idx="minor"/>
         </p:style>
         <p:txBody>
           <a:bodyPr wrap="none"/>
+          <a:lstStyle/>
           <a:p>
             <a:pPr algn="ctr">
               <a:lnSpc>
@@ -2644,13 +3543,13 @@
               </a:lnSpc>
             </a:pPr>
             <a:r>
-              <a:rPr b="1" lang="en-US" sz="5400" spc="-1" strike="noStrike">
-                <a:solidFill>
-                  <a:srgbClr val="2f2b20"/>
+              <a:rPr lang="en-US" sz="5400" b="1" strike="noStrike" spc="-1" dirty="0">
+                <a:solidFill>
+                  <a:srgbClr val="2F2B20"/>
                 </a:solidFill>
                 <a:uFill>
                   <a:solidFill>
-                    <a:srgbClr val="ffffff"/>
+                    <a:srgbClr val="FFFFFF"/>
                   </a:solidFill>
                 </a:uFill>
                 <a:latin typeface="Arial"/>
@@ -2658,13 +3557,13 @@
               </a:rPr>
               <a:t>How to Play</a:t>
             </a:r>
-            <a:endParaRPr b="0" lang="en-US" sz="1800" spc="-1" strike="noStrike">
+            <a:endParaRPr lang="en-US" sz="1800" b="0" strike="noStrike" spc="-1" dirty="0">
               <a:solidFill>
                 <a:srgbClr val="000000"/>
               </a:solidFill>
               <a:uFill>
                 <a:solidFill>
-                  <a:srgbClr val="ffffff"/>
+                  <a:srgbClr val="FFFFFF"/>
                 </a:solidFill>
               </a:uFill>
               <a:latin typeface="Arial"/>
@@ -2680,8 +3579,8 @@
         </p:nvSpPr>
         <p:spPr>
           <a:xfrm>
-            <a:off x="30998160" y="7781040"/>
-            <a:ext cx="11886840" cy="8316720"/>
+            <a:off x="30148311" y="7355492"/>
+            <a:ext cx="12523569" cy="6883422"/>
           </a:xfrm>
           <a:prstGeom prst="rect">
             <a:avLst/>
@@ -2694,13 +3593,20 @@
           </a:ln>
         </p:spPr>
         <p:style>
-          <a:lnRef idx="0"/>
-          <a:fillRef idx="0"/>
-          <a:effectRef idx="0"/>
+          <a:lnRef idx="0">
+            <a:scrgbClr r="0" g="0" b="0"/>
+          </a:lnRef>
+          <a:fillRef idx="0">
+            <a:scrgbClr r="0" g="0" b="0"/>
+          </a:fillRef>
+          <a:effectRef idx="0">
+            <a:scrgbClr r="0" g="0" b="0"/>
+          </a:effectRef>
           <a:fontRef idx="minor"/>
         </p:style>
         <p:txBody>
-          <a:bodyPr lIns="90000" rIns="90000" tIns="45000" bIns="45000"/>
+          <a:bodyPr lIns="90000" tIns="45000" rIns="90000" bIns="45000"/>
+          <a:lstStyle/>
           <a:p>
             <a:pPr>
               <a:lnSpc>
@@ -2708,13 +3614,13 @@
               </a:lnSpc>
             </a:pPr>
             <a:r>
-              <a:rPr b="0" lang="en-US" sz="6000" spc="-1" strike="noStrike">
-                <a:solidFill>
-                  <a:srgbClr val="2f2b20"/>
+              <a:rPr lang="en-US" sz="5400" b="0" strike="noStrike" spc="-1" dirty="0">
+                <a:solidFill>
+                  <a:srgbClr val="2F2B20"/>
                 </a:solidFill>
                 <a:uFill>
                   <a:solidFill>
-                    <a:srgbClr val="ffffff"/>
+                    <a:srgbClr val="FFFFFF"/>
                   </a:solidFill>
                 </a:uFill>
                 <a:latin typeface="Arial"/>
@@ -2722,13 +3628,13 @@
               </a:rPr>
               <a:t>TCP, or Transmission Control Protocol, is a reliable form of communication, where a persistent connection is made between an initiator and a listener. This connection is made with a three way handshake, consisting of a SYN message, a SYN-ACK message, and an ACK. </a:t>
             </a:r>
-            <a:endParaRPr b="0" lang="en-US" sz="1800" spc="-1" strike="noStrike">
+            <a:endParaRPr lang="en-US" sz="5400" b="0" strike="noStrike" spc="-1" dirty="0">
               <a:solidFill>
                 <a:srgbClr val="000000"/>
               </a:solidFill>
               <a:uFill>
                 <a:solidFill>
-                  <a:srgbClr val="ffffff"/>
+                  <a:srgbClr val="FFFFFF"/>
                 </a:solidFill>
               </a:uFill>
               <a:latin typeface="Arial"/>
@@ -2744,7 +3650,7 @@
         </p:nvSpPr>
         <p:spPr>
           <a:xfrm>
-            <a:off x="34135200" y="6858000"/>
+            <a:off x="33366171" y="6226226"/>
             <a:ext cx="5451120" cy="914760"/>
           </a:xfrm>
           <a:prstGeom prst="rect">
@@ -2756,13 +3662,20 @@
           </a:ln>
         </p:spPr>
         <p:style>
-          <a:lnRef idx="0"/>
-          <a:fillRef idx="0"/>
-          <a:effectRef idx="0"/>
+          <a:lnRef idx="0">
+            <a:scrgbClr r="0" g="0" b="0"/>
+          </a:lnRef>
+          <a:fillRef idx="0">
+            <a:scrgbClr r="0" g="0" b="0"/>
+          </a:fillRef>
+          <a:effectRef idx="0">
+            <a:scrgbClr r="0" g="0" b="0"/>
+          </a:effectRef>
           <a:fontRef idx="minor"/>
         </p:style>
         <p:txBody>
           <a:bodyPr wrap="none"/>
+          <a:lstStyle/>
           <a:p>
             <a:pPr algn="ctr">
               <a:lnSpc>
@@ -2770,13 +3683,13 @@
               </a:lnSpc>
             </a:pPr>
             <a:r>
-              <a:rPr b="1" lang="en-US" sz="5400" spc="-1" strike="noStrike">
-                <a:solidFill>
-                  <a:srgbClr val="2f2b20"/>
+              <a:rPr lang="en-US" sz="5400" b="1" strike="noStrike" spc="-1" dirty="0">
+                <a:solidFill>
+                  <a:srgbClr val="2F2B20"/>
                 </a:solidFill>
                 <a:uFill>
                   <a:solidFill>
-                    <a:srgbClr val="ffffff"/>
+                    <a:srgbClr val="FFFFFF"/>
                   </a:solidFill>
                 </a:uFill>
                 <a:latin typeface="Arial"/>
@@ -2784,13 +3697,13 @@
               </a:rPr>
               <a:t>How TCP Works</a:t>
             </a:r>
-            <a:endParaRPr b="0" lang="en-US" sz="1800" spc="-1" strike="noStrike">
+            <a:endParaRPr lang="en-US" sz="1800" b="0" strike="noStrike" spc="-1" dirty="0">
               <a:solidFill>
                 <a:srgbClr val="000000"/>
               </a:solidFill>
               <a:uFill>
                 <a:solidFill>
-                  <a:srgbClr val="ffffff"/>
+                  <a:srgbClr val="FFFFFF"/>
                 </a:solidFill>
               </a:uFill>
               <a:latin typeface="Arial"/>
@@ -2800,18 +3713,18 @@
       </p:sp>
       <p:pic>
         <p:nvPicPr>
-          <p:cNvPr id="55" name="" descr=""/>
+          <p:cNvPr id="55" name="Picture 54"/>
           <p:cNvPicPr/>
           <p:nvPr/>
         </p:nvPicPr>
         <p:blipFill>
-          <a:blip r:embed="rId2"/>
+          <a:blip r:embed="rId4"/>
           <a:stretch/>
         </p:blipFill>
         <p:spPr>
           <a:xfrm>
-            <a:off x="15910560" y="7020000"/>
-            <a:ext cx="12435840" cy="9073440"/>
+            <a:off x="15348295" y="8163647"/>
+            <a:ext cx="12161340" cy="8341835"/>
           </a:xfrm>
           <a:prstGeom prst="rect">
             <a:avLst/>
@@ -2821,8 +3734,316 @@
           </a:ln>
         </p:spPr>
       </p:pic>
+      <p:sp>
+        <p:nvSpPr>
+          <p:cNvPr id="2" name="TextBox 1"/>
+          <p:cNvSpPr txBox="1"/>
+          <p:nvPr/>
+        </p:nvSpPr>
+        <p:spPr>
+          <a:xfrm>
+            <a:off x="833005" y="12403867"/>
+            <a:ext cx="12266494" cy="10248960"/>
+          </a:xfrm>
+          <a:prstGeom prst="rect">
+            <a:avLst/>
+          </a:prstGeom>
+          <a:noFill/>
+          <a:ln>
+            <a:solidFill>
+              <a:schemeClr val="accent1"/>
+            </a:solidFill>
+          </a:ln>
+        </p:spPr>
+        <p:txBody>
+          <a:bodyPr wrap="square" rtlCol="0">
+            <a:spAutoFit/>
+          </a:bodyPr>
+          <a:lstStyle/>
+          <a:p>
+            <a:r>
+              <a:rPr lang="en-US" sz="4400" dirty="0"/>
+              <a:t>Can a Tic Tac Toe game be developed which allows for multiple games to be played on the same server, while on different sockets; and if so, how can this be done maintaining principles of reliability? As a team, we plan to build a Tic-Tac-Toe game that utilizes the networking concept of TCP socket connections to allow players to connect via the Internet. By housing an </a:t>
+            </a:r>
+            <a:r>
+              <a:rPr lang="en-US" sz="4400" dirty="0" err="1"/>
+              <a:t>ArrayList</a:t>
+            </a:r>
+            <a:r>
+              <a:rPr lang="en-US" sz="4400" dirty="0"/>
+              <a:t> of TCP Socket connections, a main </a:t>
+            </a:r>
+            <a:r>
+              <a:rPr lang="en-US" sz="4400" dirty="0" err="1"/>
+              <a:t>GameServer</a:t>
+            </a:r>
+            <a:r>
+              <a:rPr lang="en-US" sz="4400" dirty="0"/>
+              <a:t> will randomly pair users up and have them play a game of Tic Tac Toe. The game will not begin until they are all ready to play, so that players can engage in a tournament style competition to see who is the best of everyone </a:t>
+            </a:r>
+            <a:r>
+              <a:rPr lang="en-US" sz="4400" dirty="0" smtClean="0"/>
+              <a:t>involved. </a:t>
+            </a:r>
+            <a:endParaRPr lang="en-US" sz="4400" dirty="0"/>
+          </a:p>
+        </p:txBody>
+      </p:sp>
+      <p:sp>
+        <p:nvSpPr>
+          <p:cNvPr id="3" name="Rectangle 2"/>
+          <p:cNvSpPr/>
+          <p:nvPr/>
+        </p:nvSpPr>
+        <p:spPr>
+          <a:xfrm>
+            <a:off x="5469688" y="11373335"/>
+            <a:ext cx="2993127" cy="923330"/>
+          </a:xfrm>
+          <a:prstGeom prst="rect">
+            <a:avLst/>
+          </a:prstGeom>
+          <a:noFill/>
+        </p:spPr>
+        <p:txBody>
+          <a:bodyPr wrap="none" lIns="91440" tIns="45720" rIns="91440" bIns="45720">
+            <a:spAutoFit/>
+          </a:bodyPr>
+          <a:lstStyle/>
+          <a:p>
+            <a:pPr algn="ctr"/>
+            <a:r>
+              <a:rPr lang="en-US" sz="5400" b="1" cap="none" spc="0" dirty="0" smtClean="0">
+                <a:ln w="0"/>
+                <a:solidFill>
+                  <a:schemeClr val="tx1"/>
+                </a:solidFill>
+                <a:effectLst>
+                  <a:outerShdw blurRad="38100" dist="19050" dir="2700000" algn="tl" rotWithShape="0">
+                    <a:schemeClr val="dk1">
+                      <a:alpha val="40000"/>
+                    </a:schemeClr>
+                  </a:outerShdw>
+                </a:effectLst>
+              </a:rPr>
+              <a:t>Abstract</a:t>
+            </a:r>
+            <a:endParaRPr lang="en-US" sz="5400" b="1" cap="none" spc="0" dirty="0">
+              <a:ln w="0"/>
+              <a:solidFill>
+                <a:schemeClr val="tx1"/>
+              </a:solidFill>
+              <a:effectLst>
+                <a:outerShdw blurRad="38100" dist="19050" dir="2700000" algn="tl" rotWithShape="0">
+                  <a:schemeClr val="dk1">
+                    <a:alpha val="40000"/>
+                  </a:schemeClr>
+                </a:outerShdw>
+              </a:effectLst>
+            </a:endParaRPr>
+          </a:p>
+        </p:txBody>
+      </p:sp>
+      <p:sp>
+        <p:nvSpPr>
+          <p:cNvPr id="4" name="TextBox 3"/>
+          <p:cNvSpPr txBox="1"/>
+          <p:nvPr/>
+        </p:nvSpPr>
+        <p:spPr>
+          <a:xfrm>
+            <a:off x="833005" y="23930679"/>
+            <a:ext cx="12266494" cy="8094524"/>
+          </a:xfrm>
+          <a:prstGeom prst="rect">
+            <a:avLst/>
+          </a:prstGeom>
+          <a:noFill/>
+          <a:ln>
+            <a:solidFill>
+              <a:schemeClr val="accent1"/>
+            </a:solidFill>
+          </a:ln>
+        </p:spPr>
+        <p:txBody>
+          <a:bodyPr wrap="square" rtlCol="0">
+            <a:spAutoFit/>
+          </a:bodyPr>
+          <a:lstStyle/>
+          <a:p>
+            <a:r>
+              <a:rPr lang="en-US" sz="4000" dirty="0" smtClean="0"/>
+              <a:t>By creating this Tic Tac Toe multiplayer game, our group aims to expand our personal horizons when it comes to how TCP connections are made. By allowing for multiple games to be played on the same network, but using different sockets, our group will give users the ability to compete to be the best Tic Tac Toe player on the Wi-Fi network. By developing this game, our group plans to learn more about the fundamentals of networking and learn how to utilize those TCP connections in a reliable way, validating input however necessary and allowing for the user to set their own preferences in our GUI system as well.</a:t>
+            </a:r>
+          </a:p>
+          <a:p>
+            <a:endParaRPr lang="en-US" sz="4000" dirty="0"/>
+          </a:p>
+        </p:txBody>
+      </p:sp>
+      <p:sp>
+        <p:nvSpPr>
+          <p:cNvPr id="5" name="Rectangle 4"/>
+          <p:cNvSpPr/>
+          <p:nvPr/>
+        </p:nvSpPr>
+        <p:spPr>
+          <a:xfrm>
+            <a:off x="4793893" y="22910415"/>
+            <a:ext cx="4724371" cy="923330"/>
+          </a:xfrm>
+          <a:prstGeom prst="rect">
+            <a:avLst/>
+          </a:prstGeom>
+          <a:noFill/>
+        </p:spPr>
+        <p:txBody>
+          <a:bodyPr wrap="none" lIns="91440" tIns="45720" rIns="91440" bIns="45720">
+            <a:spAutoFit/>
+          </a:bodyPr>
+          <a:lstStyle/>
+          <a:p>
+            <a:pPr algn="ctr"/>
+            <a:r>
+              <a:rPr lang="en-US" sz="5400" b="1" dirty="0" smtClean="0">
+                <a:ln w="0"/>
+                <a:effectLst>
+                  <a:outerShdw blurRad="38100" dist="19050" dir="2700000" algn="tl" rotWithShape="0">
+                    <a:schemeClr val="dk1">
+                      <a:alpha val="40000"/>
+                    </a:schemeClr>
+                  </a:outerShdw>
+                </a:effectLst>
+              </a:rPr>
+              <a:t>Contributions</a:t>
+            </a:r>
+            <a:endParaRPr lang="en-US" sz="5400" b="1" dirty="0">
+              <a:ln w="0"/>
+              <a:effectLst>
+                <a:outerShdw blurRad="38100" dist="19050" dir="2700000" algn="tl" rotWithShape="0">
+                  <a:schemeClr val="dk1">
+                    <a:alpha val="40000"/>
+                  </a:schemeClr>
+                </a:outerShdw>
+              </a:effectLst>
+            </a:endParaRPr>
+          </a:p>
+        </p:txBody>
+      </p:sp>
+      <p:pic>
+        <p:nvPicPr>
+          <p:cNvPr id="6" name="Picture 5"/>
+          <p:cNvPicPr>
+            <a:picLocks noChangeAspect="1"/>
+          </p:cNvPicPr>
+          <p:nvPr/>
+        </p:nvPicPr>
+        <p:blipFill rotWithShape="1">
+          <a:blip r:embed="rId5"/>
+          <a:srcRect l="8131" t="41592" r="6869"/>
+          <a:stretch/>
+        </p:blipFill>
+        <p:spPr>
+          <a:xfrm>
+            <a:off x="14646317" y="17081469"/>
+            <a:ext cx="14018468" cy="5828946"/>
+          </a:xfrm>
+          <a:prstGeom prst="rect">
+            <a:avLst/>
+          </a:prstGeom>
+        </p:spPr>
+      </p:pic>
+      <p:sp>
+        <p:nvSpPr>
+          <p:cNvPr id="9" name="TextBox 8"/>
+          <p:cNvSpPr txBox="1"/>
+          <p:nvPr/>
+        </p:nvSpPr>
+        <p:spPr>
+          <a:xfrm>
+            <a:off x="30148311" y="26517600"/>
+            <a:ext cx="12523569" cy="5507603"/>
+          </a:xfrm>
+          <a:prstGeom prst="rect">
+            <a:avLst/>
+          </a:prstGeom>
+          <a:noFill/>
+          <a:ln>
+            <a:solidFill>
+              <a:schemeClr val="accent1"/>
+            </a:solidFill>
+          </a:ln>
+        </p:spPr>
+        <p:txBody>
+          <a:bodyPr wrap="square" rtlCol="0">
+            <a:spAutoFit/>
+          </a:bodyPr>
+          <a:lstStyle/>
+          <a:p>
+            <a:endParaRPr lang="en-US" dirty="0"/>
+          </a:p>
+        </p:txBody>
+      </p:sp>
+      <p:sp>
+        <p:nvSpPr>
+          <p:cNvPr id="10" name="Rectangle 9"/>
+          <p:cNvSpPr/>
+          <p:nvPr/>
+        </p:nvSpPr>
+        <p:spPr>
+          <a:xfrm>
+            <a:off x="34056651" y="25674856"/>
+            <a:ext cx="3954930" cy="923330"/>
+          </a:xfrm>
+          <a:prstGeom prst="rect">
+            <a:avLst/>
+          </a:prstGeom>
+          <a:noFill/>
+        </p:spPr>
+        <p:txBody>
+          <a:bodyPr wrap="none" lIns="91440" tIns="45720" rIns="91440" bIns="45720">
+            <a:spAutoFit/>
+          </a:bodyPr>
+          <a:lstStyle/>
+          <a:p>
+            <a:pPr algn="ctr"/>
+            <a:r>
+              <a:rPr lang="en-US" sz="5400" b="1" cap="none" spc="0" dirty="0" smtClean="0">
+                <a:ln w="0"/>
+                <a:solidFill>
+                  <a:schemeClr val="tx1"/>
+                </a:solidFill>
+                <a:effectLst>
+                  <a:outerShdw blurRad="38100" dist="19050" dir="2700000" algn="tl" rotWithShape="0">
+                    <a:schemeClr val="dk1">
+                      <a:alpha val="40000"/>
+                    </a:schemeClr>
+                  </a:outerShdw>
+                </a:effectLst>
+              </a:rPr>
+              <a:t>Conclusion</a:t>
+            </a:r>
+            <a:endParaRPr lang="en-US" sz="5400" b="1" cap="none" spc="0" dirty="0">
+              <a:ln w="0"/>
+              <a:solidFill>
+                <a:schemeClr val="tx1"/>
+              </a:solidFill>
+              <a:effectLst>
+                <a:outerShdw blurRad="38100" dist="19050" dir="2700000" algn="tl" rotWithShape="0">
+                  <a:schemeClr val="dk1">
+                    <a:alpha val="40000"/>
+                  </a:schemeClr>
+                </a:outerShdw>
+              </a:effectLst>
+            </a:endParaRPr>
+          </a:p>
+        </p:txBody>
+      </p:sp>
     </p:spTree>
   </p:cSld>
+  <p:clrMapOvr>
+    <a:masterClrMapping/>
+  </p:clrMapOvr>
   <p:timing>
     <p:tnLst>
       <p:par>
@@ -2831,14 +4052,14 @@
             <p:seq>
               <p:cTn id="2" nodeType="mainSeq"/>
               <p:prevCondLst>
-                <p:cond delay="0" evt="onPrev">
+                <p:cond evt="onPrev" delay="0">
                   <p:tgtEl>
                     <p:sldTgt/>
                   </p:tgtEl>
                 </p:cond>
               </p:prevCondLst>
               <p:nextCondLst>
-                <p:cond delay="0" evt="onNext">
+                <p:cond evt="onNext" delay="0">
                   <p:tgtEl>
                     <p:sldTgt/>
                   </p:tgtEl>
@@ -3073,6 +4294,8 @@
       </a:bgFillStyleLst>
     </a:fmtScheme>
   </a:themeElements>
+  <a:objectDefaults/>
+  <a:extraClrSchemeLst/>
 </a:theme>
 </file>
 
@@ -3296,5 +4519,7 @@
       </a:bgFillStyleLst>
     </a:fmtScheme>
   </a:themeElements>
+  <a:objectDefaults/>
+  <a:extraClrSchemeLst/>
 </a:theme>
 </file>
</xml_diff>

<commit_message>
Draft of complete Poster
</commit_message>
<xml_diff>
--- a/Poster353.pptx
+++ b/Poster353.pptx
@@ -107,6 +107,11 @@
       </a:defRPr>
     </a:lvl9pPr>
   </p:defaultTextStyle>
+  <p:extLst>
+    <p:ext uri="{EFAFB233-063F-42B5-8137-9DF3F51BA10A}">
+      <p15:sldGuideLst xmlns:p15="http://schemas.microsoft.com/office/powerpoint/2012/main"/>
+    </p:ext>
+  </p:extLst>
 </p:presentation>
 </file>
 
@@ -3063,7 +3068,7 @@
                 <a:latin typeface="Arial"/>
                 <a:ea typeface="MS PGothic"/>
               </a:rPr>
-              <a:t>The aim of this project was to investigate the aspects of </a:t>
+              <a:t>The aim of this project was to investigate the aspects </a:t>
             </a:r>
             <a:r>
               <a:rPr lang="en-US" sz="4800" b="0" strike="noStrike" spc="-1" dirty="0" smtClean="0">
@@ -3078,7 +3083,7 @@
                 <a:latin typeface="Arial"/>
                 <a:ea typeface="MS PGothic"/>
               </a:rPr>
-              <a:t>Transmission </a:t>
+              <a:t>and use of the Transmission </a:t>
             </a:r>
             <a:r>
               <a:rPr lang="en-US" sz="4800" b="0" strike="noStrike" spc="-1" dirty="0">
@@ -3940,7 +3945,7 @@
         </p:nvPicPr>
         <p:blipFill rotWithShape="1">
           <a:blip r:embed="rId5"/>
-          <a:srcRect l="8131" t="41592" r="6869"/>
+          <a:srcRect l="8131" t="41592" r="6869" b="8258"/>
           <a:stretch/>
         </p:blipFill>
         <p:spPr>
@@ -3962,7 +3967,7 @@
         <p:spPr>
           <a:xfrm>
             <a:off x="30148311" y="26517600"/>
-            <a:ext cx="12523569" cy="5507603"/>
+            <a:ext cx="12523569" cy="4524315"/>
           </a:xfrm>
           <a:prstGeom prst="rect">
             <a:avLst/>
@@ -3980,7 +3985,11 @@
           </a:bodyPr>
           <a:lstStyle/>
           <a:p>
-            <a:endParaRPr lang="en-US" dirty="0"/>
+            <a:r>
+              <a:rPr lang="en-US" sz="4800" dirty="0" smtClean="0"/>
+              <a:t>In Summary, as a connection-orientated delivery service, it is necessary for a connection to be established between clients through the server. With TCP, a reliable service is provided and can be used for a host of different applications. </a:t>
+            </a:r>
+            <a:endParaRPr lang="en-US" sz="4800" dirty="0"/>
           </a:p>
         </p:txBody>
       </p:sp>
@@ -4039,6 +4048,35 @@
           </a:p>
         </p:txBody>
       </p:sp>
+      <p:pic>
+        <p:nvPicPr>
+          <p:cNvPr id="7" name="Picture 6"/>
+          <p:cNvPicPr>
+            <a:picLocks noChangeAspect="1"/>
+          </p:cNvPicPr>
+          <p:nvPr/>
+        </p:nvPicPr>
+        <p:blipFill rotWithShape="1">
+          <a:blip r:embed="rId6">
+            <a:extLst>
+              <a:ext uri="{28A0092B-C50C-407E-A947-70E740481C1C}">
+                <a14:useLocalDpi xmlns:a14="http://schemas.microsoft.com/office/drawing/2010/main" val="0"/>
+              </a:ext>
+            </a:extLst>
+          </a:blip>
+          <a:srcRect l="8215" r="6304" b="9494"/>
+          <a:stretch/>
+        </p:blipFill>
+        <p:spPr>
+          <a:xfrm>
+            <a:off x="15638474" y="22910415"/>
+            <a:ext cx="11402185" cy="9054316"/>
+          </a:xfrm>
+          <a:prstGeom prst="rect">
+            <a:avLst/>
+          </a:prstGeom>
+        </p:spPr>
+      </p:pic>
     </p:spTree>
   </p:cSld>
   <p:clrMapOvr>

</xml_diff>